<commit_message>
powerpoint and readme for presentation
</commit_message>
<xml_diff>
--- a/Github introduction Lukas.pptx
+++ b/Github introduction Lukas.pptx
@@ -5,32 +5,35 @@
     <p:sldMasterId id="2147483648" r:id="rId1"/>
   </p:sldMasterIdLst>
   <p:notesMasterIdLst>
-    <p:notesMasterId r:id="rId17"/>
+    <p:notesMasterId r:id="rId20"/>
   </p:notesMasterIdLst>
   <p:handoutMasterIdLst>
-    <p:handoutMasterId r:id="rId18"/>
+    <p:handoutMasterId r:id="rId21"/>
   </p:handoutMasterIdLst>
   <p:sldIdLst>
     <p:sldId id="256" r:id="rId2"/>
     <p:sldId id="287" r:id="rId3"/>
-    <p:sldId id="302" r:id="rId4"/>
-    <p:sldId id="291" r:id="rId5"/>
+    <p:sldId id="291" r:id="rId4"/>
+    <p:sldId id="302" r:id="rId5"/>
     <p:sldId id="286" r:id="rId6"/>
     <p:sldId id="290" r:id="rId7"/>
     <p:sldId id="293" r:id="rId8"/>
     <p:sldId id="303" r:id="rId9"/>
     <p:sldId id="297" r:id="rId10"/>
     <p:sldId id="295" r:id="rId11"/>
-    <p:sldId id="300" r:id="rId12"/>
-    <p:sldId id="298" r:id="rId13"/>
-    <p:sldId id="304" r:id="rId14"/>
-    <p:sldId id="301" r:id="rId15"/>
-    <p:sldId id="292" r:id="rId16"/>
+    <p:sldId id="305" r:id="rId12"/>
+    <p:sldId id="304" r:id="rId13"/>
+    <p:sldId id="306" r:id="rId14"/>
+    <p:sldId id="300" r:id="rId15"/>
+    <p:sldId id="307" r:id="rId16"/>
+    <p:sldId id="292" r:id="rId17"/>
+    <p:sldId id="298" r:id="rId18"/>
+    <p:sldId id="301" r:id="rId19"/>
   </p:sldIdLst>
   <p:sldSz cx="9144000" cy="6858000" type="screen4x3"/>
   <p:notesSz cx="7099300" cy="10234613"/>
   <p:custDataLst>
-    <p:tags r:id="rId19"/>
+    <p:tags r:id="rId22"/>
   </p:custDataLst>
   <p:defaultTextStyle>
     <a:defPPr>
@@ -1094,7 +1097,7 @@
 </p:notes>
 </file>
 
-<file path=ppt/notesSlides/notesSlide2.xml><?xml version="1.0" encoding="utf-8"?>
+<file path=ppt/notesSlides/notesSlide10.xml><?xml version="1.0" encoding="utf-8"?>
 <p:notes xmlns:a="http://schemas.openxmlformats.org/drawingml/2006/main" xmlns:r="http://schemas.openxmlformats.org/officeDocument/2006/relationships" xmlns:p="http://schemas.openxmlformats.org/presentationml/2006/main">
   <p:cSld>
     <p:spTree>
@@ -1339,7 +1342,7 @@
                   <a:spcPct val="0"/>
                 </a:spcBef>
               </a:pPr>
-              <a:t>4</a:t>
+              <a:t>16</a:t>
             </a:fld>
             <a:endParaRPr lang="en-US" altLang="en-US" sz="1300"/>
           </a:p>
@@ -1348,7 +1351,7 @@
     </p:spTree>
     <p:extLst>
       <p:ext uri="{BB962C8B-B14F-4D97-AF65-F5344CB8AC3E}">
-        <p14:creationId xmlns:p14="http://schemas.microsoft.com/office/powerpoint/2010/main" val="2635453380"/>
+        <p14:creationId xmlns:p14="http://schemas.microsoft.com/office/powerpoint/2010/main" val="949377513"/>
       </p:ext>
     </p:extLst>
   </p:cSld>
@@ -1358,7 +1361,7 @@
 </p:notes>
 </file>
 
-<file path=ppt/notesSlides/notesSlide3.xml><?xml version="1.0" encoding="utf-8"?>
+<file path=ppt/notesSlides/notesSlide11.xml><?xml version="1.0" encoding="utf-8"?>
 <p:notes xmlns:a="http://schemas.openxmlformats.org/drawingml/2006/main" xmlns:r="http://schemas.openxmlformats.org/officeDocument/2006/relationships" xmlns:p="http://schemas.openxmlformats.org/presentationml/2006/main">
   <p:cSld>
     <p:spTree>
@@ -1402,6 +1405,52 @@
           <a:bodyPr/>
           <a:lstStyle/>
           <a:p>
+            <a:r>
+              <a:rPr lang="en-US" dirty="0"/>
+              <a:t>Can undo</a:t>
+            </a:r>
+            <a:r>
+              <a:rPr lang="en-US" baseline="0" dirty="0"/>
+              <a:t> mistakenly deleted branches (before you merged them) and mistaken </a:t>
+            </a:r>
+            <a:r>
+              <a:rPr lang="en-US" baseline="0" dirty="0" err="1"/>
+              <a:t>git</a:t>
+            </a:r>
+            <a:r>
+              <a:rPr lang="en-US" baseline="0" dirty="0"/>
+              <a:t> reset --hard using </a:t>
+            </a:r>
+            <a:r>
+              <a:rPr lang="en-US" baseline="0" dirty="0" err="1"/>
+              <a:t>git</a:t>
+            </a:r>
+            <a:r>
+              <a:rPr lang="en-US" baseline="0" dirty="0"/>
+              <a:t> </a:t>
+            </a:r>
+            <a:r>
+              <a:rPr lang="en-US" baseline="0" dirty="0" err="1"/>
+              <a:t>reflog</a:t>
+            </a:r>
+            <a:r>
+              <a:rPr lang="en-US" baseline="0" dirty="0"/>
+              <a:t> (but 30 day limit).</a:t>
+            </a:r>
+          </a:p>
+          <a:p>
+            <a:r>
+              <a:rPr lang="en-US" baseline="0" dirty="0"/>
+              <a:t>Another way to undo: </a:t>
+            </a:r>
+            <a:r>
+              <a:rPr lang="en-US" baseline="0" dirty="0" err="1"/>
+              <a:t>git</a:t>
+            </a:r>
+            <a:r>
+              <a:rPr lang="en-US" baseline="0" dirty="0"/>
+              <a:t> revert</a:t>
+            </a:r>
             <a:endParaRPr lang="en-US" dirty="0"/>
           </a:p>
         </p:txBody>
@@ -1429,456 +1478,7 @@
               <a:pPr>
                 <a:defRPr/>
               </a:pPr>
-              <a:t>6</a:t>
-            </a:fld>
-            <a:endParaRPr lang="en-US" altLang="en-US"/>
-          </a:p>
-        </p:txBody>
-      </p:sp>
-    </p:spTree>
-    <p:extLst>
-      <p:ext uri="{BB962C8B-B14F-4D97-AF65-F5344CB8AC3E}">
-        <p14:creationId xmlns:p14="http://schemas.microsoft.com/office/powerpoint/2010/main" val="1950933556"/>
-      </p:ext>
-    </p:extLst>
-  </p:cSld>
-  <p:clrMapOvr>
-    <a:masterClrMapping/>
-  </p:clrMapOvr>
-</p:notes>
-</file>
-
-<file path=ppt/notesSlides/notesSlide4.xml><?xml version="1.0" encoding="utf-8"?>
-<p:notes xmlns:a="http://schemas.openxmlformats.org/drawingml/2006/main" xmlns:r="http://schemas.openxmlformats.org/officeDocument/2006/relationships" xmlns:p="http://schemas.openxmlformats.org/presentationml/2006/main">
-  <p:cSld>
-    <p:spTree>
-      <p:nvGrpSpPr>
-        <p:cNvPr id="1" name=""/>
-        <p:cNvGrpSpPr/>
-        <p:nvPr/>
-      </p:nvGrpSpPr>
-      <p:grpSpPr>
-        <a:xfrm>
-          <a:off x="0" y="0"/>
-          <a:ext cx="0" cy="0"/>
-          <a:chOff x="0" y="0"/>
-          <a:chExt cx="0" cy="0"/>
-        </a:xfrm>
-      </p:grpSpPr>
-      <p:sp>
-        <p:nvSpPr>
-          <p:cNvPr id="2" name="Slide Image Placeholder 1"/>
-          <p:cNvSpPr>
-            <a:spLocks noGrp="1" noRot="1" noChangeAspect="1"/>
-          </p:cNvSpPr>
-          <p:nvPr>
-            <p:ph type="sldImg"/>
-          </p:nvPr>
-        </p:nvSpPr>
-        <p:spPr/>
-      </p:sp>
-      <p:sp>
-        <p:nvSpPr>
-          <p:cNvPr id="3" name="Notes Placeholder 2"/>
-          <p:cNvSpPr>
-            <a:spLocks noGrp="1"/>
-          </p:cNvSpPr>
-          <p:nvPr>
-            <p:ph type="body" idx="1"/>
-          </p:nvPr>
-        </p:nvSpPr>
-        <p:spPr/>
-        <p:txBody>
-          <a:bodyPr/>
-          <a:lstStyle/>
-          <a:p>
-            <a:r>
-              <a:rPr lang="en-US" dirty="0"/>
-              <a:t>/data/*</a:t>
-            </a:r>
-            <a:r>
-              <a:rPr lang="en-US" baseline="0" dirty="0"/>
-              <a:t> or /data/** could make it delete things you don’t want, see </a:t>
-            </a:r>
-            <a:r>
-              <a:rPr lang="en-US" baseline="0" dirty="0"/>
-              <a:t>https://web.archive.org/web/20140310215100/http://blog.icefusion.co.uk:80/git-stash-can-delete-ignored-files-git-stash-u/</a:t>
-            </a:r>
-          </a:p>
-          <a:p>
-            <a:endParaRPr lang="en-US" baseline="0" dirty="0"/>
-          </a:p>
-          <a:p>
-            <a:r>
-              <a:rPr lang="en-US" baseline="0" dirty="0"/>
-              <a:t>If you add a .</a:t>
-            </a:r>
-            <a:r>
-              <a:rPr lang="en-US" baseline="0" dirty="0" err="1"/>
-              <a:t>gitignore</a:t>
-            </a:r>
-            <a:r>
-              <a:rPr lang="en-US" baseline="0" dirty="0"/>
-              <a:t> *.txt, but there was previously a tracked .txt file that you had committed, it won’t ignore that file. You can first remove that file from the repo, do a commit, then re-add it to the repo (then it will get ignored). Or use </a:t>
-            </a:r>
-            <a:r>
-              <a:rPr lang="en-US" dirty="0" err="1"/>
-              <a:t>git</a:t>
-            </a:r>
-            <a:r>
-              <a:rPr lang="en-US" dirty="0"/>
-              <a:t> </a:t>
-            </a:r>
-            <a:r>
-              <a:rPr lang="en-US" dirty="0" err="1"/>
-              <a:t>rm</a:t>
-            </a:r>
-            <a:r>
-              <a:rPr lang="en-US" dirty="0"/>
-              <a:t> --cached file_to_ignore.txt</a:t>
-            </a:r>
-            <a:endParaRPr lang="en-US" dirty="0"/>
-          </a:p>
-        </p:txBody>
-      </p:sp>
-      <p:sp>
-        <p:nvSpPr>
-          <p:cNvPr id="4" name="Slide Number Placeholder 3"/>
-          <p:cNvSpPr>
-            <a:spLocks noGrp="1"/>
-          </p:cNvSpPr>
-          <p:nvPr>
-            <p:ph type="sldNum" sz="quarter" idx="10"/>
-          </p:nvPr>
-        </p:nvSpPr>
-        <p:spPr/>
-        <p:txBody>
-          <a:bodyPr/>
-          <a:lstStyle/>
-          <a:p>
-            <a:pPr>
-              <a:defRPr/>
-            </a:pPr>
-            <a:fld id="{CEFBEFB6-B82C-40CB-BB88-B7326F66A97A}" type="slidenum">
-              <a:rPr lang="en-US" altLang="en-US" smtClean="0"/>
-              <a:pPr>
-                <a:defRPr/>
-              </a:pPr>
-              <a:t>7</a:t>
-            </a:fld>
-            <a:endParaRPr lang="en-US" altLang="en-US"/>
-          </a:p>
-        </p:txBody>
-      </p:sp>
-    </p:spTree>
-    <p:extLst>
-      <p:ext uri="{BB962C8B-B14F-4D97-AF65-F5344CB8AC3E}">
-        <p14:creationId xmlns:p14="http://schemas.microsoft.com/office/powerpoint/2010/main" val="1087970570"/>
-      </p:ext>
-    </p:extLst>
-  </p:cSld>
-  <p:clrMapOvr>
-    <a:masterClrMapping/>
-  </p:clrMapOvr>
-</p:notes>
-</file>
-
-<file path=ppt/notesSlides/notesSlide5.xml><?xml version="1.0" encoding="utf-8"?>
-<p:notes xmlns:a="http://schemas.openxmlformats.org/drawingml/2006/main" xmlns:r="http://schemas.openxmlformats.org/officeDocument/2006/relationships" xmlns:p="http://schemas.openxmlformats.org/presentationml/2006/main">
-  <p:cSld>
-    <p:spTree>
-      <p:nvGrpSpPr>
-        <p:cNvPr id="1" name=""/>
-        <p:cNvGrpSpPr/>
-        <p:nvPr/>
-      </p:nvGrpSpPr>
-      <p:grpSpPr>
-        <a:xfrm>
-          <a:off x="0" y="0"/>
-          <a:ext cx="0" cy="0"/>
-          <a:chOff x="0" y="0"/>
-          <a:chExt cx="0" cy="0"/>
-        </a:xfrm>
-      </p:grpSpPr>
-      <p:sp>
-        <p:nvSpPr>
-          <p:cNvPr id="2" name="Slide Image Placeholder 1"/>
-          <p:cNvSpPr>
-            <a:spLocks noGrp="1" noRot="1" noChangeAspect="1"/>
-          </p:cNvSpPr>
-          <p:nvPr>
-            <p:ph type="sldImg"/>
-          </p:nvPr>
-        </p:nvSpPr>
-        <p:spPr/>
-      </p:sp>
-      <p:sp>
-        <p:nvSpPr>
-          <p:cNvPr id="3" name="Notes Placeholder 2"/>
-          <p:cNvSpPr>
-            <a:spLocks noGrp="1"/>
-          </p:cNvSpPr>
-          <p:nvPr>
-            <p:ph type="body" idx="1"/>
-          </p:nvPr>
-        </p:nvSpPr>
-        <p:spPr/>
-        <p:txBody>
-          <a:bodyPr/>
-          <a:lstStyle/>
-          <a:p>
-            <a:endParaRPr lang="en-US" dirty="0"/>
-          </a:p>
-        </p:txBody>
-      </p:sp>
-      <p:sp>
-        <p:nvSpPr>
-          <p:cNvPr id="4" name="Slide Number Placeholder 3"/>
-          <p:cNvSpPr>
-            <a:spLocks noGrp="1"/>
-          </p:cNvSpPr>
-          <p:nvPr>
-            <p:ph type="sldNum" sz="quarter" idx="10"/>
-          </p:nvPr>
-        </p:nvSpPr>
-        <p:spPr/>
-        <p:txBody>
-          <a:bodyPr/>
-          <a:lstStyle/>
-          <a:p>
-            <a:pPr>
-              <a:defRPr/>
-            </a:pPr>
-            <a:fld id="{CEFBEFB6-B82C-40CB-BB88-B7326F66A97A}" type="slidenum">
-              <a:rPr lang="en-US" altLang="en-US" smtClean="0"/>
-              <a:pPr>
-                <a:defRPr/>
-              </a:pPr>
-              <a:t>9</a:t>
-            </a:fld>
-            <a:endParaRPr lang="en-US" altLang="en-US"/>
-          </a:p>
-        </p:txBody>
-      </p:sp>
-    </p:spTree>
-    <p:extLst>
-      <p:ext uri="{BB962C8B-B14F-4D97-AF65-F5344CB8AC3E}">
-        <p14:creationId xmlns:p14="http://schemas.microsoft.com/office/powerpoint/2010/main" val="939611227"/>
-      </p:ext>
-    </p:extLst>
-  </p:cSld>
-  <p:clrMapOvr>
-    <a:masterClrMapping/>
-  </p:clrMapOvr>
-</p:notes>
-</file>
-
-<file path=ppt/notesSlides/notesSlide6.xml><?xml version="1.0" encoding="utf-8"?>
-<p:notes xmlns:a="http://schemas.openxmlformats.org/drawingml/2006/main" xmlns:r="http://schemas.openxmlformats.org/officeDocument/2006/relationships" xmlns:p="http://schemas.openxmlformats.org/presentationml/2006/main">
-  <p:cSld>
-    <p:spTree>
-      <p:nvGrpSpPr>
-        <p:cNvPr id="1" name=""/>
-        <p:cNvGrpSpPr/>
-        <p:nvPr/>
-      </p:nvGrpSpPr>
-      <p:grpSpPr>
-        <a:xfrm>
-          <a:off x="0" y="0"/>
-          <a:ext cx="0" cy="0"/>
-          <a:chOff x="0" y="0"/>
-          <a:chExt cx="0" cy="0"/>
-        </a:xfrm>
-      </p:grpSpPr>
-      <p:sp>
-        <p:nvSpPr>
-          <p:cNvPr id="2" name="Slide Image Placeholder 1"/>
-          <p:cNvSpPr>
-            <a:spLocks noGrp="1" noRot="1" noChangeAspect="1"/>
-          </p:cNvSpPr>
-          <p:nvPr>
-            <p:ph type="sldImg"/>
-          </p:nvPr>
-        </p:nvSpPr>
-        <p:spPr/>
-      </p:sp>
-      <p:sp>
-        <p:nvSpPr>
-          <p:cNvPr id="3" name="Notes Placeholder 2"/>
-          <p:cNvSpPr>
-            <a:spLocks noGrp="1"/>
-          </p:cNvSpPr>
-          <p:nvPr>
-            <p:ph type="body" idx="1"/>
-          </p:nvPr>
-        </p:nvSpPr>
-        <p:spPr/>
-        <p:txBody>
-          <a:bodyPr/>
-          <a:lstStyle/>
-          <a:p>
-            <a:r>
-              <a:rPr lang="en-US" dirty="0"/>
-              <a:t>"remote" is just some </a:t>
-            </a:r>
-            <a:r>
-              <a:rPr lang="en-US" b="1" dirty="0" err="1"/>
-              <a:t>git</a:t>
-            </a:r>
-            <a:r>
-              <a:rPr lang="en-US" dirty="0"/>
-              <a:t> repository not on your computer (e.g. on </a:t>
-            </a:r>
-            <a:r>
-              <a:rPr lang="en-US" dirty="0" err="1"/>
-              <a:t>github</a:t>
-            </a:r>
-            <a:r>
-              <a:rPr lang="en-US" dirty="0"/>
-              <a:t>). "</a:t>
-            </a:r>
-            <a:r>
-              <a:rPr lang="en-US" b="1" dirty="0"/>
-              <a:t>origin</a:t>
-            </a:r>
-            <a:r>
-              <a:rPr lang="en-US" dirty="0"/>
-              <a:t>" is the repository you cloned your repository from (e.g. the one on your </a:t>
-            </a:r>
-            <a:r>
-              <a:rPr lang="en-US" dirty="0" err="1"/>
-              <a:t>github</a:t>
-            </a:r>
-            <a:r>
-              <a:rPr lang="en-US" dirty="0"/>
-              <a:t>). "master" is just the name of the default branch. ... </a:t>
-            </a:r>
-            <a:r>
-              <a:rPr lang="en-US" b="1" dirty="0"/>
-              <a:t>Origin</a:t>
-            </a:r>
-            <a:r>
-              <a:rPr lang="en-US" dirty="0"/>
-              <a:t> is the default name for a remote repository, but you may change that. https://www.quora.com/What-does-git-remote-and-origin-mean </a:t>
-            </a:r>
-            <a:endParaRPr lang="en-US" dirty="0"/>
-          </a:p>
-        </p:txBody>
-      </p:sp>
-      <p:sp>
-        <p:nvSpPr>
-          <p:cNvPr id="4" name="Slide Number Placeholder 3"/>
-          <p:cNvSpPr>
-            <a:spLocks noGrp="1"/>
-          </p:cNvSpPr>
-          <p:nvPr>
-            <p:ph type="sldNum" sz="quarter" idx="10"/>
-          </p:nvPr>
-        </p:nvSpPr>
-        <p:spPr/>
-        <p:txBody>
-          <a:bodyPr/>
-          <a:lstStyle/>
-          <a:p>
-            <a:pPr>
-              <a:defRPr/>
-            </a:pPr>
-            <a:fld id="{CEFBEFB6-B82C-40CB-BB88-B7326F66A97A}" type="slidenum">
-              <a:rPr lang="en-US" altLang="en-US" smtClean="0"/>
-              <a:pPr>
-                <a:defRPr/>
-              </a:pPr>
-              <a:t>10</a:t>
-            </a:fld>
-            <a:endParaRPr lang="en-US" altLang="en-US"/>
-          </a:p>
-        </p:txBody>
-      </p:sp>
-    </p:spTree>
-    <p:extLst>
-      <p:ext uri="{BB962C8B-B14F-4D97-AF65-F5344CB8AC3E}">
-        <p14:creationId xmlns:p14="http://schemas.microsoft.com/office/powerpoint/2010/main" val="2445941499"/>
-      </p:ext>
-    </p:extLst>
-  </p:cSld>
-  <p:clrMapOvr>
-    <a:masterClrMapping/>
-  </p:clrMapOvr>
-</p:notes>
-</file>
-
-<file path=ppt/notesSlides/notesSlide7.xml><?xml version="1.0" encoding="utf-8"?>
-<p:notes xmlns:a="http://schemas.openxmlformats.org/drawingml/2006/main" xmlns:r="http://schemas.openxmlformats.org/officeDocument/2006/relationships" xmlns:p="http://schemas.openxmlformats.org/presentationml/2006/main">
-  <p:cSld>
-    <p:spTree>
-      <p:nvGrpSpPr>
-        <p:cNvPr id="1" name=""/>
-        <p:cNvGrpSpPr/>
-        <p:nvPr/>
-      </p:nvGrpSpPr>
-      <p:grpSpPr>
-        <a:xfrm>
-          <a:off x="0" y="0"/>
-          <a:ext cx="0" cy="0"/>
-          <a:chOff x="0" y="0"/>
-          <a:chExt cx="0" cy="0"/>
-        </a:xfrm>
-      </p:grpSpPr>
-      <p:sp>
-        <p:nvSpPr>
-          <p:cNvPr id="2" name="Slide Image Placeholder 1"/>
-          <p:cNvSpPr>
-            <a:spLocks noGrp="1" noRot="1" noChangeAspect="1"/>
-          </p:cNvSpPr>
-          <p:nvPr>
-            <p:ph type="sldImg"/>
-          </p:nvPr>
-        </p:nvSpPr>
-        <p:spPr/>
-      </p:sp>
-      <p:sp>
-        <p:nvSpPr>
-          <p:cNvPr id="3" name="Notes Placeholder 2"/>
-          <p:cNvSpPr>
-            <a:spLocks noGrp="1"/>
-          </p:cNvSpPr>
-          <p:nvPr>
-            <p:ph type="body" idx="1"/>
-          </p:nvPr>
-        </p:nvSpPr>
-        <p:spPr/>
-        <p:txBody>
-          <a:bodyPr/>
-          <a:lstStyle/>
-          <a:p>
-            <a:endParaRPr lang="en-US" dirty="0"/>
-          </a:p>
-        </p:txBody>
-      </p:sp>
-      <p:sp>
-        <p:nvSpPr>
-          <p:cNvPr id="4" name="Slide Number Placeholder 3"/>
-          <p:cNvSpPr>
-            <a:spLocks noGrp="1"/>
-          </p:cNvSpPr>
-          <p:nvPr>
-            <p:ph type="sldNum" sz="quarter" idx="10"/>
-          </p:nvPr>
-        </p:nvSpPr>
-        <p:spPr/>
-        <p:txBody>
-          <a:bodyPr/>
-          <a:lstStyle/>
-          <a:p>
-            <a:pPr>
-              <a:defRPr/>
-            </a:pPr>
-            <a:fld id="{CEFBEFB6-B82C-40CB-BB88-B7326F66A97A}" type="slidenum">
-              <a:rPr lang="en-US" altLang="en-US" smtClean="0"/>
-              <a:pPr>
-                <a:defRPr/>
-              </a:pPr>
-              <a:t>12</a:t>
+              <a:t>17</a:t>
             </a:fld>
             <a:endParaRPr lang="en-US" altLang="en-US"/>
           </a:p>
@@ -1897,7 +1497,7 @@
 </p:notes>
 </file>
 
-<file path=ppt/notesSlides/notesSlide8.xml><?xml version="1.0" encoding="utf-8"?>
+<file path=ppt/notesSlides/notesSlide2.xml><?xml version="1.0" encoding="utf-8"?>
 <p:notes xmlns:a="http://schemas.openxmlformats.org/drawingml/2006/main" xmlns:r="http://schemas.openxmlformats.org/officeDocument/2006/relationships" xmlns:p="http://schemas.openxmlformats.org/presentationml/2006/main">
   <p:cSld>
     <p:spTree>
@@ -2142,7 +1742,7 @@
                   <a:spcPct val="0"/>
                 </a:spcBef>
               </a:pPr>
-              <a:t>15</a:t>
+              <a:t>3</a:t>
             </a:fld>
             <a:endParaRPr lang="en-US" altLang="en-US" sz="1300"/>
           </a:p>
@@ -2151,7 +1751,744 @@
     </p:spTree>
     <p:extLst>
       <p:ext uri="{BB962C8B-B14F-4D97-AF65-F5344CB8AC3E}">
-        <p14:creationId xmlns:p14="http://schemas.microsoft.com/office/powerpoint/2010/main" val="949377513"/>
+        <p14:creationId xmlns:p14="http://schemas.microsoft.com/office/powerpoint/2010/main" val="2635453380"/>
+      </p:ext>
+    </p:extLst>
+  </p:cSld>
+  <p:clrMapOvr>
+    <a:masterClrMapping/>
+  </p:clrMapOvr>
+</p:notes>
+</file>
+
+<file path=ppt/notesSlides/notesSlide3.xml><?xml version="1.0" encoding="utf-8"?>
+<p:notes xmlns:a="http://schemas.openxmlformats.org/drawingml/2006/main" xmlns:r="http://schemas.openxmlformats.org/officeDocument/2006/relationships" xmlns:p="http://schemas.openxmlformats.org/presentationml/2006/main">
+  <p:cSld>
+    <p:spTree>
+      <p:nvGrpSpPr>
+        <p:cNvPr id="1" name=""/>
+        <p:cNvGrpSpPr/>
+        <p:nvPr/>
+      </p:nvGrpSpPr>
+      <p:grpSpPr>
+        <a:xfrm>
+          <a:off x="0" y="0"/>
+          <a:ext cx="0" cy="0"/>
+          <a:chOff x="0" y="0"/>
+          <a:chExt cx="0" cy="0"/>
+        </a:xfrm>
+      </p:grpSpPr>
+      <p:sp>
+        <p:nvSpPr>
+          <p:cNvPr id="2" name="Slide Image Placeholder 1"/>
+          <p:cNvSpPr>
+            <a:spLocks noGrp="1" noRot="1" noChangeAspect="1"/>
+          </p:cNvSpPr>
+          <p:nvPr>
+            <p:ph type="sldImg"/>
+          </p:nvPr>
+        </p:nvSpPr>
+        <p:spPr/>
+      </p:sp>
+      <p:sp>
+        <p:nvSpPr>
+          <p:cNvPr id="3" name="Notes Placeholder 2"/>
+          <p:cNvSpPr>
+            <a:spLocks noGrp="1"/>
+          </p:cNvSpPr>
+          <p:nvPr>
+            <p:ph type="body" idx="1"/>
+          </p:nvPr>
+        </p:nvSpPr>
+        <p:spPr/>
+        <p:txBody>
+          <a:bodyPr/>
+          <a:lstStyle/>
+          <a:p>
+            <a:endParaRPr lang="en-US" dirty="0"/>
+          </a:p>
+        </p:txBody>
+      </p:sp>
+      <p:sp>
+        <p:nvSpPr>
+          <p:cNvPr id="4" name="Slide Number Placeholder 3"/>
+          <p:cNvSpPr>
+            <a:spLocks noGrp="1"/>
+          </p:cNvSpPr>
+          <p:nvPr>
+            <p:ph type="sldNum" sz="quarter" idx="10"/>
+          </p:nvPr>
+        </p:nvSpPr>
+        <p:spPr/>
+        <p:txBody>
+          <a:bodyPr/>
+          <a:lstStyle/>
+          <a:p>
+            <a:pPr>
+              <a:defRPr/>
+            </a:pPr>
+            <a:fld id="{CEFBEFB6-B82C-40CB-BB88-B7326F66A97A}" type="slidenum">
+              <a:rPr lang="en-US" altLang="en-US" smtClean="0"/>
+              <a:pPr>
+                <a:defRPr/>
+              </a:pPr>
+              <a:t>4</a:t>
+            </a:fld>
+            <a:endParaRPr lang="en-US" altLang="en-US"/>
+          </a:p>
+        </p:txBody>
+      </p:sp>
+    </p:spTree>
+    <p:extLst>
+      <p:ext uri="{BB962C8B-B14F-4D97-AF65-F5344CB8AC3E}">
+        <p14:creationId xmlns:p14="http://schemas.microsoft.com/office/powerpoint/2010/main" val="3613398306"/>
+      </p:ext>
+    </p:extLst>
+  </p:cSld>
+  <p:clrMapOvr>
+    <a:masterClrMapping/>
+  </p:clrMapOvr>
+</p:notes>
+</file>
+
+<file path=ppt/notesSlides/notesSlide4.xml><?xml version="1.0" encoding="utf-8"?>
+<p:notes xmlns:a="http://schemas.openxmlformats.org/drawingml/2006/main" xmlns:r="http://schemas.openxmlformats.org/officeDocument/2006/relationships" xmlns:p="http://schemas.openxmlformats.org/presentationml/2006/main">
+  <p:cSld>
+    <p:spTree>
+      <p:nvGrpSpPr>
+        <p:cNvPr id="1" name=""/>
+        <p:cNvGrpSpPr/>
+        <p:nvPr/>
+      </p:nvGrpSpPr>
+      <p:grpSpPr>
+        <a:xfrm>
+          <a:off x="0" y="0"/>
+          <a:ext cx="0" cy="0"/>
+          <a:chOff x="0" y="0"/>
+          <a:chExt cx="0" cy="0"/>
+        </a:xfrm>
+      </p:grpSpPr>
+      <p:sp>
+        <p:nvSpPr>
+          <p:cNvPr id="2" name="Slide Image Placeholder 1"/>
+          <p:cNvSpPr>
+            <a:spLocks noGrp="1" noRot="1" noChangeAspect="1"/>
+          </p:cNvSpPr>
+          <p:nvPr>
+            <p:ph type="sldImg"/>
+          </p:nvPr>
+        </p:nvSpPr>
+        <p:spPr/>
+      </p:sp>
+      <p:sp>
+        <p:nvSpPr>
+          <p:cNvPr id="3" name="Notes Placeholder 2"/>
+          <p:cNvSpPr>
+            <a:spLocks noGrp="1"/>
+          </p:cNvSpPr>
+          <p:nvPr>
+            <p:ph type="body" idx="1"/>
+          </p:nvPr>
+        </p:nvSpPr>
+        <p:spPr/>
+        <p:txBody>
+          <a:bodyPr/>
+          <a:lstStyle/>
+          <a:p>
+            <a:endParaRPr lang="en-US" dirty="0"/>
+          </a:p>
+        </p:txBody>
+      </p:sp>
+      <p:sp>
+        <p:nvSpPr>
+          <p:cNvPr id="4" name="Slide Number Placeholder 3"/>
+          <p:cNvSpPr>
+            <a:spLocks noGrp="1"/>
+          </p:cNvSpPr>
+          <p:nvPr>
+            <p:ph type="sldNum" sz="quarter" idx="10"/>
+          </p:nvPr>
+        </p:nvSpPr>
+        <p:spPr/>
+        <p:txBody>
+          <a:bodyPr/>
+          <a:lstStyle/>
+          <a:p>
+            <a:pPr>
+              <a:defRPr/>
+            </a:pPr>
+            <a:fld id="{CEFBEFB6-B82C-40CB-BB88-B7326F66A97A}" type="slidenum">
+              <a:rPr lang="en-US" altLang="en-US" smtClean="0"/>
+              <a:pPr>
+                <a:defRPr/>
+              </a:pPr>
+              <a:t>6</a:t>
+            </a:fld>
+            <a:endParaRPr lang="en-US" altLang="en-US"/>
+          </a:p>
+        </p:txBody>
+      </p:sp>
+    </p:spTree>
+    <p:extLst>
+      <p:ext uri="{BB962C8B-B14F-4D97-AF65-F5344CB8AC3E}">
+        <p14:creationId xmlns:p14="http://schemas.microsoft.com/office/powerpoint/2010/main" val="1950933556"/>
+      </p:ext>
+    </p:extLst>
+  </p:cSld>
+  <p:clrMapOvr>
+    <a:masterClrMapping/>
+  </p:clrMapOvr>
+</p:notes>
+</file>
+
+<file path=ppt/notesSlides/notesSlide5.xml><?xml version="1.0" encoding="utf-8"?>
+<p:notes xmlns:a="http://schemas.openxmlformats.org/drawingml/2006/main" xmlns:r="http://schemas.openxmlformats.org/officeDocument/2006/relationships" xmlns:p="http://schemas.openxmlformats.org/presentationml/2006/main">
+  <p:cSld>
+    <p:spTree>
+      <p:nvGrpSpPr>
+        <p:cNvPr id="1" name=""/>
+        <p:cNvGrpSpPr/>
+        <p:nvPr/>
+      </p:nvGrpSpPr>
+      <p:grpSpPr>
+        <a:xfrm>
+          <a:off x="0" y="0"/>
+          <a:ext cx="0" cy="0"/>
+          <a:chOff x="0" y="0"/>
+          <a:chExt cx="0" cy="0"/>
+        </a:xfrm>
+      </p:grpSpPr>
+      <p:sp>
+        <p:nvSpPr>
+          <p:cNvPr id="2" name="Slide Image Placeholder 1"/>
+          <p:cNvSpPr>
+            <a:spLocks noGrp="1" noRot="1" noChangeAspect="1"/>
+          </p:cNvSpPr>
+          <p:nvPr>
+            <p:ph type="sldImg"/>
+          </p:nvPr>
+        </p:nvSpPr>
+        <p:spPr/>
+      </p:sp>
+      <p:sp>
+        <p:nvSpPr>
+          <p:cNvPr id="3" name="Notes Placeholder 2"/>
+          <p:cNvSpPr>
+            <a:spLocks noGrp="1"/>
+          </p:cNvSpPr>
+          <p:nvPr>
+            <p:ph type="body" idx="1"/>
+          </p:nvPr>
+        </p:nvSpPr>
+        <p:spPr/>
+        <p:txBody>
+          <a:bodyPr/>
+          <a:lstStyle/>
+          <a:p>
+            <a:r>
+              <a:rPr lang="en-US" dirty="0"/>
+              <a:t>/data/*</a:t>
+            </a:r>
+            <a:r>
+              <a:rPr lang="en-US" baseline="0" dirty="0"/>
+              <a:t> or /data/** could make it delete things you don’t want, see https://web.archive.org/web/20140310215100/http://blog.icefusion.co.uk:80/git-stash-can-delete-ignored-files-git-stash-u/</a:t>
+            </a:r>
+          </a:p>
+          <a:p>
+            <a:endParaRPr lang="en-US" baseline="0" dirty="0"/>
+          </a:p>
+          <a:p>
+            <a:r>
+              <a:rPr lang="en-US" baseline="0" dirty="0"/>
+              <a:t>If you add a .</a:t>
+            </a:r>
+            <a:r>
+              <a:rPr lang="en-US" baseline="0" dirty="0" err="1"/>
+              <a:t>gitignore</a:t>
+            </a:r>
+            <a:r>
+              <a:rPr lang="en-US" baseline="0" dirty="0"/>
+              <a:t> *.txt, but there was previously a tracked .txt file that you had committed, it won’t ignore that file. You can first remove that file from the repo, do a commit, then re-add it to the repo (then it will get ignored). Or use </a:t>
+            </a:r>
+            <a:r>
+              <a:rPr lang="en-US" dirty="0" err="1"/>
+              <a:t>git</a:t>
+            </a:r>
+            <a:r>
+              <a:rPr lang="en-US" dirty="0"/>
+              <a:t> </a:t>
+            </a:r>
+            <a:r>
+              <a:rPr lang="en-US" dirty="0" err="1"/>
+              <a:t>rm</a:t>
+            </a:r>
+            <a:r>
+              <a:rPr lang="en-US" dirty="0"/>
+              <a:t> --cached file_to_ignore.txt</a:t>
+            </a:r>
+          </a:p>
+        </p:txBody>
+      </p:sp>
+      <p:sp>
+        <p:nvSpPr>
+          <p:cNvPr id="4" name="Slide Number Placeholder 3"/>
+          <p:cNvSpPr>
+            <a:spLocks noGrp="1"/>
+          </p:cNvSpPr>
+          <p:nvPr>
+            <p:ph type="sldNum" sz="quarter" idx="10"/>
+          </p:nvPr>
+        </p:nvSpPr>
+        <p:spPr/>
+        <p:txBody>
+          <a:bodyPr/>
+          <a:lstStyle/>
+          <a:p>
+            <a:pPr>
+              <a:defRPr/>
+            </a:pPr>
+            <a:fld id="{CEFBEFB6-B82C-40CB-BB88-B7326F66A97A}" type="slidenum">
+              <a:rPr lang="en-US" altLang="en-US" smtClean="0"/>
+              <a:pPr>
+                <a:defRPr/>
+              </a:pPr>
+              <a:t>7</a:t>
+            </a:fld>
+            <a:endParaRPr lang="en-US" altLang="en-US"/>
+          </a:p>
+        </p:txBody>
+      </p:sp>
+    </p:spTree>
+    <p:extLst>
+      <p:ext uri="{BB962C8B-B14F-4D97-AF65-F5344CB8AC3E}">
+        <p14:creationId xmlns:p14="http://schemas.microsoft.com/office/powerpoint/2010/main" val="1087970570"/>
+      </p:ext>
+    </p:extLst>
+  </p:cSld>
+  <p:clrMapOvr>
+    <a:masterClrMapping/>
+  </p:clrMapOvr>
+</p:notes>
+</file>
+
+<file path=ppt/notesSlides/notesSlide6.xml><?xml version="1.0" encoding="utf-8"?>
+<p:notes xmlns:a="http://schemas.openxmlformats.org/drawingml/2006/main" xmlns:r="http://schemas.openxmlformats.org/officeDocument/2006/relationships" xmlns:p="http://schemas.openxmlformats.org/presentationml/2006/main">
+  <p:cSld>
+    <p:spTree>
+      <p:nvGrpSpPr>
+        <p:cNvPr id="1" name=""/>
+        <p:cNvGrpSpPr/>
+        <p:nvPr/>
+      </p:nvGrpSpPr>
+      <p:grpSpPr>
+        <a:xfrm>
+          <a:off x="0" y="0"/>
+          <a:ext cx="0" cy="0"/>
+          <a:chOff x="0" y="0"/>
+          <a:chExt cx="0" cy="0"/>
+        </a:xfrm>
+      </p:grpSpPr>
+      <p:sp>
+        <p:nvSpPr>
+          <p:cNvPr id="2" name="Slide Image Placeholder 1"/>
+          <p:cNvSpPr>
+            <a:spLocks noGrp="1" noRot="1" noChangeAspect="1"/>
+          </p:cNvSpPr>
+          <p:nvPr>
+            <p:ph type="sldImg"/>
+          </p:nvPr>
+        </p:nvSpPr>
+        <p:spPr/>
+      </p:sp>
+      <p:sp>
+        <p:nvSpPr>
+          <p:cNvPr id="3" name="Notes Placeholder 2"/>
+          <p:cNvSpPr>
+            <a:spLocks noGrp="1"/>
+          </p:cNvSpPr>
+          <p:nvPr>
+            <p:ph type="body" idx="1"/>
+          </p:nvPr>
+        </p:nvSpPr>
+        <p:spPr/>
+        <p:txBody>
+          <a:bodyPr/>
+          <a:lstStyle/>
+          <a:p>
+            <a:endParaRPr lang="en-US" dirty="0"/>
+          </a:p>
+        </p:txBody>
+      </p:sp>
+      <p:sp>
+        <p:nvSpPr>
+          <p:cNvPr id="4" name="Slide Number Placeholder 3"/>
+          <p:cNvSpPr>
+            <a:spLocks noGrp="1"/>
+          </p:cNvSpPr>
+          <p:nvPr>
+            <p:ph type="sldNum" sz="quarter" idx="10"/>
+          </p:nvPr>
+        </p:nvSpPr>
+        <p:spPr/>
+        <p:txBody>
+          <a:bodyPr/>
+          <a:lstStyle/>
+          <a:p>
+            <a:pPr>
+              <a:defRPr/>
+            </a:pPr>
+            <a:fld id="{CEFBEFB6-B82C-40CB-BB88-B7326F66A97A}" type="slidenum">
+              <a:rPr lang="en-US" altLang="en-US" smtClean="0"/>
+              <a:pPr>
+                <a:defRPr/>
+              </a:pPr>
+              <a:t>8</a:t>
+            </a:fld>
+            <a:endParaRPr lang="en-US" altLang="en-US"/>
+          </a:p>
+        </p:txBody>
+      </p:sp>
+    </p:spTree>
+    <p:extLst>
+      <p:ext uri="{BB962C8B-B14F-4D97-AF65-F5344CB8AC3E}">
+        <p14:creationId xmlns:p14="http://schemas.microsoft.com/office/powerpoint/2010/main" val="495416134"/>
+      </p:ext>
+    </p:extLst>
+  </p:cSld>
+  <p:clrMapOvr>
+    <a:masterClrMapping/>
+  </p:clrMapOvr>
+</p:notes>
+</file>
+
+<file path=ppt/notesSlides/notesSlide7.xml><?xml version="1.0" encoding="utf-8"?>
+<p:notes xmlns:a="http://schemas.openxmlformats.org/drawingml/2006/main" xmlns:r="http://schemas.openxmlformats.org/officeDocument/2006/relationships" xmlns:p="http://schemas.openxmlformats.org/presentationml/2006/main">
+  <p:cSld>
+    <p:spTree>
+      <p:nvGrpSpPr>
+        <p:cNvPr id="1" name=""/>
+        <p:cNvGrpSpPr/>
+        <p:nvPr/>
+      </p:nvGrpSpPr>
+      <p:grpSpPr>
+        <a:xfrm>
+          <a:off x="0" y="0"/>
+          <a:ext cx="0" cy="0"/>
+          <a:chOff x="0" y="0"/>
+          <a:chExt cx="0" cy="0"/>
+        </a:xfrm>
+      </p:grpSpPr>
+      <p:sp>
+        <p:nvSpPr>
+          <p:cNvPr id="2" name="Slide Image Placeholder 1"/>
+          <p:cNvSpPr>
+            <a:spLocks noGrp="1" noRot="1" noChangeAspect="1"/>
+          </p:cNvSpPr>
+          <p:nvPr>
+            <p:ph type="sldImg"/>
+          </p:nvPr>
+        </p:nvSpPr>
+        <p:spPr/>
+      </p:sp>
+      <p:sp>
+        <p:nvSpPr>
+          <p:cNvPr id="3" name="Notes Placeholder 2"/>
+          <p:cNvSpPr>
+            <a:spLocks noGrp="1"/>
+          </p:cNvSpPr>
+          <p:nvPr>
+            <p:ph type="body" idx="1"/>
+          </p:nvPr>
+        </p:nvSpPr>
+        <p:spPr/>
+        <p:txBody>
+          <a:bodyPr/>
+          <a:lstStyle/>
+          <a:p>
+            <a:endParaRPr lang="en-US" dirty="0"/>
+          </a:p>
+        </p:txBody>
+      </p:sp>
+      <p:sp>
+        <p:nvSpPr>
+          <p:cNvPr id="4" name="Slide Number Placeholder 3"/>
+          <p:cNvSpPr>
+            <a:spLocks noGrp="1"/>
+          </p:cNvSpPr>
+          <p:nvPr>
+            <p:ph type="sldNum" sz="quarter" idx="10"/>
+          </p:nvPr>
+        </p:nvSpPr>
+        <p:spPr/>
+        <p:txBody>
+          <a:bodyPr/>
+          <a:lstStyle/>
+          <a:p>
+            <a:pPr>
+              <a:defRPr/>
+            </a:pPr>
+            <a:fld id="{CEFBEFB6-B82C-40CB-BB88-B7326F66A97A}" type="slidenum">
+              <a:rPr lang="en-US" altLang="en-US" smtClean="0"/>
+              <a:pPr>
+                <a:defRPr/>
+              </a:pPr>
+              <a:t>9</a:t>
+            </a:fld>
+            <a:endParaRPr lang="en-US" altLang="en-US"/>
+          </a:p>
+        </p:txBody>
+      </p:sp>
+    </p:spTree>
+    <p:extLst>
+      <p:ext uri="{BB962C8B-B14F-4D97-AF65-F5344CB8AC3E}">
+        <p14:creationId xmlns:p14="http://schemas.microsoft.com/office/powerpoint/2010/main" val="939611227"/>
+      </p:ext>
+    </p:extLst>
+  </p:cSld>
+  <p:clrMapOvr>
+    <a:masterClrMapping/>
+  </p:clrMapOvr>
+</p:notes>
+</file>
+
+<file path=ppt/notesSlides/notesSlide8.xml><?xml version="1.0" encoding="utf-8"?>
+<p:notes xmlns:a="http://schemas.openxmlformats.org/drawingml/2006/main" xmlns:r="http://schemas.openxmlformats.org/officeDocument/2006/relationships" xmlns:p="http://schemas.openxmlformats.org/presentationml/2006/main">
+  <p:cSld>
+    <p:spTree>
+      <p:nvGrpSpPr>
+        <p:cNvPr id="1" name=""/>
+        <p:cNvGrpSpPr/>
+        <p:nvPr/>
+      </p:nvGrpSpPr>
+      <p:grpSpPr>
+        <a:xfrm>
+          <a:off x="0" y="0"/>
+          <a:ext cx="0" cy="0"/>
+          <a:chOff x="0" y="0"/>
+          <a:chExt cx="0" cy="0"/>
+        </a:xfrm>
+      </p:grpSpPr>
+      <p:sp>
+        <p:nvSpPr>
+          <p:cNvPr id="2" name="Slide Image Placeholder 1"/>
+          <p:cNvSpPr>
+            <a:spLocks noGrp="1" noRot="1" noChangeAspect="1"/>
+          </p:cNvSpPr>
+          <p:nvPr>
+            <p:ph type="sldImg"/>
+          </p:nvPr>
+        </p:nvSpPr>
+        <p:spPr/>
+      </p:sp>
+      <p:sp>
+        <p:nvSpPr>
+          <p:cNvPr id="3" name="Notes Placeholder 2"/>
+          <p:cNvSpPr>
+            <a:spLocks noGrp="1"/>
+          </p:cNvSpPr>
+          <p:nvPr>
+            <p:ph type="body" idx="1"/>
+          </p:nvPr>
+        </p:nvSpPr>
+        <p:spPr/>
+        <p:txBody>
+          <a:bodyPr/>
+          <a:lstStyle/>
+          <a:p>
+            <a:r>
+              <a:rPr lang="en-US" dirty="0"/>
+              <a:t>"remote" is just some </a:t>
+            </a:r>
+            <a:r>
+              <a:rPr lang="en-US" b="1" dirty="0" err="1"/>
+              <a:t>git</a:t>
+            </a:r>
+            <a:r>
+              <a:rPr lang="en-US" dirty="0"/>
+              <a:t> repository not on your computer (e.g. on </a:t>
+            </a:r>
+            <a:r>
+              <a:rPr lang="en-US" dirty="0" err="1"/>
+              <a:t>github</a:t>
+            </a:r>
+            <a:r>
+              <a:rPr lang="en-US" dirty="0"/>
+              <a:t>). "</a:t>
+            </a:r>
+            <a:r>
+              <a:rPr lang="en-US" b="1" dirty="0"/>
+              <a:t>origin</a:t>
+            </a:r>
+            <a:r>
+              <a:rPr lang="en-US" dirty="0"/>
+              <a:t>" is the repository you cloned your repository from (e.g. the one on your </a:t>
+            </a:r>
+            <a:r>
+              <a:rPr lang="en-US" dirty="0" err="1"/>
+              <a:t>github</a:t>
+            </a:r>
+            <a:r>
+              <a:rPr lang="en-US" dirty="0"/>
+              <a:t>). "master" is just the name of the default branch. ... </a:t>
+            </a:r>
+            <a:r>
+              <a:rPr lang="en-US" b="1" dirty="0"/>
+              <a:t>Origin</a:t>
+            </a:r>
+            <a:r>
+              <a:rPr lang="en-US" dirty="0"/>
+              <a:t> is the default name for a remote repository, but you may change that. https://www.quora.com/What-does-git-remote-and-origin-mean </a:t>
+            </a:r>
+          </a:p>
+        </p:txBody>
+      </p:sp>
+      <p:sp>
+        <p:nvSpPr>
+          <p:cNvPr id="4" name="Slide Number Placeholder 3"/>
+          <p:cNvSpPr>
+            <a:spLocks noGrp="1"/>
+          </p:cNvSpPr>
+          <p:nvPr>
+            <p:ph type="sldNum" sz="quarter" idx="10"/>
+          </p:nvPr>
+        </p:nvSpPr>
+        <p:spPr/>
+        <p:txBody>
+          <a:bodyPr/>
+          <a:lstStyle/>
+          <a:p>
+            <a:pPr>
+              <a:defRPr/>
+            </a:pPr>
+            <a:fld id="{CEFBEFB6-B82C-40CB-BB88-B7326F66A97A}" type="slidenum">
+              <a:rPr lang="en-US" altLang="en-US" smtClean="0"/>
+              <a:pPr>
+                <a:defRPr/>
+              </a:pPr>
+              <a:t>10</a:t>
+            </a:fld>
+            <a:endParaRPr lang="en-US" altLang="en-US"/>
+          </a:p>
+        </p:txBody>
+      </p:sp>
+    </p:spTree>
+    <p:extLst>
+      <p:ext uri="{BB962C8B-B14F-4D97-AF65-F5344CB8AC3E}">
+        <p14:creationId xmlns:p14="http://schemas.microsoft.com/office/powerpoint/2010/main" val="2445941499"/>
+      </p:ext>
+    </p:extLst>
+  </p:cSld>
+  <p:clrMapOvr>
+    <a:masterClrMapping/>
+  </p:clrMapOvr>
+</p:notes>
+</file>
+
+<file path=ppt/notesSlides/notesSlide9.xml><?xml version="1.0" encoding="utf-8"?>
+<p:notes xmlns:a="http://schemas.openxmlformats.org/drawingml/2006/main" xmlns:r="http://schemas.openxmlformats.org/officeDocument/2006/relationships" xmlns:p="http://schemas.openxmlformats.org/presentationml/2006/main">
+  <p:cSld>
+    <p:spTree>
+      <p:nvGrpSpPr>
+        <p:cNvPr id="1" name=""/>
+        <p:cNvGrpSpPr/>
+        <p:nvPr/>
+      </p:nvGrpSpPr>
+      <p:grpSpPr>
+        <a:xfrm>
+          <a:off x="0" y="0"/>
+          <a:ext cx="0" cy="0"/>
+          <a:chOff x="0" y="0"/>
+          <a:chExt cx="0" cy="0"/>
+        </a:xfrm>
+      </p:grpSpPr>
+      <p:sp>
+        <p:nvSpPr>
+          <p:cNvPr id="2" name="Slide Image Placeholder 1"/>
+          <p:cNvSpPr>
+            <a:spLocks noGrp="1" noRot="1" noChangeAspect="1"/>
+          </p:cNvSpPr>
+          <p:nvPr>
+            <p:ph type="sldImg"/>
+          </p:nvPr>
+        </p:nvSpPr>
+        <p:spPr/>
+      </p:sp>
+      <p:sp>
+        <p:nvSpPr>
+          <p:cNvPr id="3" name="Notes Placeholder 2"/>
+          <p:cNvSpPr>
+            <a:spLocks noGrp="1"/>
+          </p:cNvSpPr>
+          <p:nvPr>
+            <p:ph type="body" idx="1"/>
+          </p:nvPr>
+        </p:nvSpPr>
+        <p:spPr/>
+        <p:txBody>
+          <a:bodyPr/>
+          <a:lstStyle/>
+          <a:p>
+            <a:r>
+              <a:rPr lang="en-US" dirty="0"/>
+              <a:t>Note: origin is not always the same as</a:t>
+            </a:r>
+            <a:r>
+              <a:rPr lang="en-US" baseline="0" dirty="0"/>
+              <a:t> your </a:t>
+            </a:r>
+            <a:r>
+              <a:rPr lang="en-US" baseline="0" dirty="0" err="1"/>
+              <a:t>Github</a:t>
+            </a:r>
+            <a:r>
+              <a:rPr lang="en-US" baseline="0" dirty="0"/>
+              <a:t> repo! You can actually rename it to a different repo. Or, if you clone from someone else’s repo it will be their repo and not yours. But by default when you clone your own repo, </a:t>
+            </a:r>
+            <a:r>
+              <a:rPr lang="en-US" baseline="0" dirty="0" err="1"/>
+              <a:t>git</a:t>
+            </a:r>
+            <a:r>
+              <a:rPr lang="en-US" baseline="0" dirty="0"/>
+              <a:t> sets origin to that repo.</a:t>
+            </a:r>
+            <a:endParaRPr lang="en-US" dirty="0"/>
+          </a:p>
+        </p:txBody>
+      </p:sp>
+      <p:sp>
+        <p:nvSpPr>
+          <p:cNvPr id="4" name="Slide Number Placeholder 3"/>
+          <p:cNvSpPr>
+            <a:spLocks noGrp="1"/>
+          </p:cNvSpPr>
+          <p:nvPr>
+            <p:ph type="sldNum" sz="quarter" idx="10"/>
+          </p:nvPr>
+        </p:nvSpPr>
+        <p:spPr/>
+        <p:txBody>
+          <a:bodyPr/>
+          <a:lstStyle/>
+          <a:p>
+            <a:pPr>
+              <a:defRPr/>
+            </a:pPr>
+            <a:fld id="{CEFBEFB6-B82C-40CB-BB88-B7326F66A97A}" type="slidenum">
+              <a:rPr lang="en-US" altLang="en-US" smtClean="0"/>
+              <a:pPr>
+                <a:defRPr/>
+              </a:pPr>
+              <a:t>13</a:t>
+            </a:fld>
+            <a:endParaRPr lang="en-US" altLang="en-US"/>
+          </a:p>
+        </p:txBody>
+      </p:sp>
+    </p:spTree>
+    <p:extLst>
+      <p:ext uri="{BB962C8B-B14F-4D97-AF65-F5344CB8AC3E}">
+        <p14:creationId xmlns:p14="http://schemas.microsoft.com/office/powerpoint/2010/main" val="2970995206"/>
       </p:ext>
     </p:extLst>
   </p:cSld>
@@ -5634,7 +5971,7 @@
               <a:t> has been explicitly told to ignore.” (</a:t>
             </a:r>
             <a:r>
-              <a:rPr lang="en-US" dirty="0">
+              <a:rPr lang="en-US" dirty="0" err="1">
                 <a:hlinkClick r:id="rId3"/>
               </a:rPr>
               <a:t>Slideshare</a:t>
@@ -5645,6 +5982,26 @@
             </a:r>
           </a:p>
           <a:p>
+            <a:pPr lvl="1"/>
+            <a:endParaRPr lang="en-US" dirty="0"/>
+          </a:p>
+          <a:p>
+            <a:pPr lvl="1"/>
+            <a:endParaRPr lang="en-US" dirty="0"/>
+          </a:p>
+          <a:p>
+            <a:endParaRPr lang="en-US" dirty="0">
+              <a:latin typeface="Courier New" panose="02070309020205020404" pitchFamily="49" charset="0"/>
+              <a:cs typeface="Courier New" panose="02070309020205020404" pitchFamily="49" charset="0"/>
+            </a:endParaRPr>
+          </a:p>
+          <a:p>
+            <a:endParaRPr lang="en-US" dirty="0">
+              <a:latin typeface="Courier New" panose="02070309020205020404" pitchFamily="49" charset="0"/>
+              <a:cs typeface="Courier New" panose="02070309020205020404" pitchFamily="49" charset="0"/>
+            </a:endParaRPr>
+          </a:p>
+          <a:p>
             <a:r>
               <a:rPr lang="en-US" dirty="0" err="1">
                 <a:latin typeface="Courier New" panose="02070309020205020404" pitchFamily="49" charset="0"/>
@@ -5677,7 +6034,7 @@
                 <a:latin typeface="Courier New" panose="02070309020205020404" pitchFamily="49" charset="0"/>
                 <a:cs typeface="Courier New" panose="02070309020205020404" pitchFamily="49" charset="0"/>
               </a:rPr>
-              <a:t> commit –a –m “Added </a:t>
+              <a:t> commit –am “Added </a:t>
             </a:r>
             <a:r>
               <a:rPr lang="en-US" dirty="0" err="1">
@@ -5693,27 +6050,22 @@
               </a:rPr>
               <a:t> script”</a:t>
             </a:r>
-          </a:p>
-          <a:p>
-            <a:r>
-              <a:rPr lang="en-US" dirty="0" err="1">
-                <a:latin typeface="Courier New" panose="02070309020205020404" pitchFamily="49" charset="0"/>
-                <a:cs typeface="Courier New" panose="02070309020205020404" pitchFamily="49" charset="0"/>
-              </a:rPr>
-              <a:t>git</a:t>
-            </a:r>
             <a:r>
               <a:rPr lang="en-US" dirty="0">
-                <a:latin typeface="Courier New" panose="02070309020205020404" pitchFamily="49" charset="0"/>
-                <a:cs typeface="Courier New" panose="02070309020205020404" pitchFamily="49" charset="0"/>
-              </a:rPr>
-              <a:t> push origin master </a:t>
-            </a:r>
+                <a:cs typeface="Courier New" panose="02070309020205020404" pitchFamily="49" charset="0"/>
+              </a:rPr>
+              <a:t> </a:t>
+            </a:r>
+          </a:p>
+          <a:p>
+            <a:pPr marL="228600" indent="0">
+              <a:buNone/>
+            </a:pPr>
             <a:r>
               <a:rPr lang="en-US" dirty="0">
                 <a:cs typeface="Courier New" panose="02070309020205020404" pitchFamily="49" charset="0"/>
               </a:rPr>
-              <a:t>- sync local machine changes to online repo</a:t>
+              <a:t> - commit changes on current branch</a:t>
             </a:r>
           </a:p>
           <a:p>
@@ -5740,8 +6092,8 @@
         </p:blipFill>
         <p:spPr>
           <a:xfrm>
-            <a:off x="2971800" y="5105400"/>
-            <a:ext cx="4191000" cy="1468872"/>
+            <a:off x="2667000" y="3657600"/>
+            <a:ext cx="4495800" cy="1575699"/>
           </a:xfrm>
           <a:prstGeom prst="rect">
             <a:avLst/>
@@ -5795,7 +6147,1186 @@
           <a:p>
             <a:r>
               <a:rPr lang="en-US" dirty="0"/>
+              <a:t>Make some more commits</a:t>
+            </a:r>
+          </a:p>
+        </p:txBody>
+      </p:sp>
+      <p:sp>
+        <p:nvSpPr>
+          <p:cNvPr id="3" name="Content Placeholder 2"/>
+          <p:cNvSpPr>
+            <a:spLocks noGrp="1"/>
+          </p:cNvSpPr>
+          <p:nvPr>
+            <p:ph idx="1"/>
+          </p:nvPr>
+        </p:nvSpPr>
+        <p:spPr>
+          <a:xfrm>
+            <a:off x="0" y="1295400"/>
+            <a:ext cx="8763000" cy="4572000"/>
+          </a:xfrm>
+        </p:spPr>
+        <p:txBody>
+          <a:bodyPr/>
+          <a:lstStyle/>
+          <a:p>
+            <a:r>
+              <a:rPr lang="en-US" dirty="0"/>
+              <a:t>Hack</a:t>
+            </a:r>
+            <a:r>
+              <a:rPr lang="en-US" dirty="0">
+                <a:cs typeface="Courier New" panose="02070309020205020404" pitchFamily="49" charset="0"/>
+              </a:rPr>
+              <a:t>, </a:t>
+            </a:r>
+            <a:r>
+              <a:rPr lang="en-US" dirty="0" err="1">
+                <a:latin typeface="Courier New" panose="02070309020205020404" pitchFamily="49" charset="0"/>
+                <a:cs typeface="Courier New" panose="02070309020205020404" pitchFamily="49" charset="0"/>
+              </a:rPr>
+              <a:t>git</a:t>
+            </a:r>
+            <a:r>
+              <a:rPr lang="en-US" dirty="0">
+                <a:latin typeface="Courier New" panose="02070309020205020404" pitchFamily="49" charset="0"/>
+                <a:cs typeface="Courier New" panose="02070309020205020404" pitchFamily="49" charset="0"/>
+              </a:rPr>
+              <a:t> add –A; </a:t>
+            </a:r>
+            <a:r>
+              <a:rPr lang="en-US" dirty="0" err="1">
+                <a:latin typeface="Courier New" panose="02070309020205020404" pitchFamily="49" charset="0"/>
+                <a:cs typeface="Courier New" panose="02070309020205020404" pitchFamily="49" charset="0"/>
+              </a:rPr>
+              <a:t>git</a:t>
+            </a:r>
+            <a:r>
+              <a:rPr lang="en-US" dirty="0">
+                <a:latin typeface="Courier New" panose="02070309020205020404" pitchFamily="49" charset="0"/>
+                <a:cs typeface="Courier New" panose="02070309020205020404" pitchFamily="49" charset="0"/>
+              </a:rPr>
+              <a:t> commit –am “commit 2”</a:t>
+            </a:r>
+          </a:p>
+          <a:p>
+            <a:r>
+              <a:rPr lang="en-US" dirty="0"/>
+              <a:t>Hack, </a:t>
+            </a:r>
+            <a:r>
+              <a:rPr lang="en-US" dirty="0" err="1">
+                <a:latin typeface="Courier New" panose="02070309020205020404" pitchFamily="49" charset="0"/>
+                <a:cs typeface="Courier New" panose="02070309020205020404" pitchFamily="49" charset="0"/>
+              </a:rPr>
+              <a:t>git</a:t>
+            </a:r>
+            <a:r>
+              <a:rPr lang="en-US" dirty="0">
+                <a:latin typeface="Courier New" panose="02070309020205020404" pitchFamily="49" charset="0"/>
+                <a:cs typeface="Courier New" panose="02070309020205020404" pitchFamily="49" charset="0"/>
+              </a:rPr>
+              <a:t> add –A; </a:t>
+            </a:r>
+            <a:r>
+              <a:rPr lang="en-US" dirty="0" err="1">
+                <a:latin typeface="Courier New" panose="02070309020205020404" pitchFamily="49" charset="0"/>
+                <a:cs typeface="Courier New" panose="02070309020205020404" pitchFamily="49" charset="0"/>
+              </a:rPr>
+              <a:t>git</a:t>
+            </a:r>
+            <a:r>
+              <a:rPr lang="en-US" dirty="0">
+                <a:latin typeface="Courier New" panose="02070309020205020404" pitchFamily="49" charset="0"/>
+                <a:cs typeface="Courier New" panose="02070309020205020404" pitchFamily="49" charset="0"/>
+              </a:rPr>
+              <a:t> commit –am “commit 3”</a:t>
+            </a:r>
+            <a:endParaRPr lang="en-US" dirty="0"/>
+          </a:p>
+          <a:p>
+            <a:r>
+              <a:rPr lang="en-US" dirty="0"/>
+              <a:t>Hack, </a:t>
+            </a:r>
+            <a:r>
+              <a:rPr lang="en-US" dirty="0" err="1">
+                <a:latin typeface="Courier New" panose="02070309020205020404" pitchFamily="49" charset="0"/>
+                <a:cs typeface="Courier New" panose="02070309020205020404" pitchFamily="49" charset="0"/>
+              </a:rPr>
+              <a:t>git</a:t>
+            </a:r>
+            <a:r>
+              <a:rPr lang="en-US" dirty="0">
+                <a:latin typeface="Courier New" panose="02070309020205020404" pitchFamily="49" charset="0"/>
+                <a:cs typeface="Courier New" panose="02070309020205020404" pitchFamily="49" charset="0"/>
+              </a:rPr>
+              <a:t> add –A; </a:t>
+            </a:r>
+            <a:r>
+              <a:rPr lang="en-US" dirty="0" err="1">
+                <a:latin typeface="Courier New" panose="02070309020205020404" pitchFamily="49" charset="0"/>
+                <a:cs typeface="Courier New" panose="02070309020205020404" pitchFamily="49" charset="0"/>
+              </a:rPr>
+              <a:t>git</a:t>
+            </a:r>
+            <a:r>
+              <a:rPr lang="en-US" dirty="0">
+                <a:latin typeface="Courier New" panose="02070309020205020404" pitchFamily="49" charset="0"/>
+                <a:cs typeface="Courier New" panose="02070309020205020404" pitchFamily="49" charset="0"/>
+              </a:rPr>
+              <a:t> commit –am “commit 4”</a:t>
+            </a:r>
+          </a:p>
+          <a:p>
+            <a:r>
+              <a:rPr lang="en-US" dirty="0"/>
+              <a:t>Commit tree looks like this now:</a:t>
+            </a:r>
+          </a:p>
+          <a:p>
+            <a:endParaRPr lang="en-US" dirty="0"/>
+          </a:p>
+          <a:p>
+            <a:endParaRPr lang="en-US" dirty="0"/>
+          </a:p>
+          <a:p>
+            <a:endParaRPr lang="en-US" dirty="0"/>
+          </a:p>
+          <a:p>
+            <a:endParaRPr lang="en-US" dirty="0"/>
+          </a:p>
+          <a:p>
+            <a:endParaRPr lang="en-US" dirty="0"/>
+          </a:p>
+          <a:p>
+            <a:r>
+              <a:rPr lang="en-US" i="1" dirty="0"/>
+              <a:t>Don’t have to use </a:t>
+            </a:r>
+            <a:r>
+              <a:rPr lang="en-US" i="1" dirty="0" err="1">
+                <a:latin typeface="Courier New" panose="02070309020205020404" pitchFamily="49" charset="0"/>
+                <a:cs typeface="Courier New" panose="02070309020205020404" pitchFamily="49" charset="0"/>
+              </a:rPr>
+              <a:t>git</a:t>
+            </a:r>
+            <a:r>
+              <a:rPr lang="en-US" i="1" dirty="0">
+                <a:latin typeface="Courier New" panose="02070309020205020404" pitchFamily="49" charset="0"/>
+                <a:cs typeface="Courier New" panose="02070309020205020404" pitchFamily="49" charset="0"/>
+              </a:rPr>
+              <a:t> add </a:t>
+            </a:r>
+            <a:r>
+              <a:rPr lang="en-US" i="1" dirty="0"/>
+              <a:t>if you’re not adding or moving files but it’s safest way to ensure everything is tracked on a commit</a:t>
+            </a:r>
+            <a:endParaRPr lang="en-US" dirty="0"/>
+          </a:p>
+        </p:txBody>
+      </p:sp>
+      <p:pic>
+        <p:nvPicPr>
+          <p:cNvPr id="4" name="Picture 3"/>
+          <p:cNvPicPr>
+            <a:picLocks noChangeAspect="1"/>
+          </p:cNvPicPr>
+          <p:nvPr/>
+        </p:nvPicPr>
+        <p:blipFill rotWithShape="1">
+          <a:blip r:embed="rId2">
+            <a:extLst>
+              <a:ext uri="{28A0092B-C50C-407E-A947-70E740481C1C}">
+                <a14:useLocalDpi xmlns:a14="http://schemas.microsoft.com/office/drawing/2010/main" val="0"/>
+              </a:ext>
+            </a:extLst>
+          </a:blip>
+          <a:srcRect r="58333" b="13260"/>
+          <a:stretch/>
+        </p:blipFill>
+        <p:spPr>
+          <a:xfrm>
+            <a:off x="6705600" y="2451100"/>
+            <a:ext cx="1803400" cy="2654380"/>
+          </a:xfrm>
+          <a:prstGeom prst="rect">
+            <a:avLst/>
+          </a:prstGeom>
+        </p:spPr>
+      </p:pic>
+      <p:pic>
+        <p:nvPicPr>
+          <p:cNvPr id="5" name="Picture 4"/>
+          <p:cNvPicPr>
+            <a:picLocks noChangeAspect="1"/>
+          </p:cNvPicPr>
+          <p:nvPr/>
+        </p:nvPicPr>
+        <p:blipFill rotWithShape="1">
+          <a:blip r:embed="rId3"/>
+          <a:srcRect l="787" t="8889" r="80055" b="82416"/>
+          <a:stretch/>
+        </p:blipFill>
+        <p:spPr>
+          <a:xfrm>
+            <a:off x="381000" y="3267148"/>
+            <a:ext cx="5410200" cy="1381052"/>
+          </a:xfrm>
+          <a:prstGeom prst="rect">
+            <a:avLst/>
+          </a:prstGeom>
+        </p:spPr>
+      </p:pic>
+    </p:spTree>
+    <p:extLst>
+      <p:ext uri="{BB962C8B-B14F-4D97-AF65-F5344CB8AC3E}">
+        <p14:creationId xmlns:p14="http://schemas.microsoft.com/office/powerpoint/2010/main" val="515657591"/>
+      </p:ext>
+    </p:extLst>
+  </p:cSld>
+  <p:clrMapOvr>
+    <a:masterClrMapping/>
+  </p:clrMapOvr>
+</p:sld>
+</file>
+
+<file path=ppt/slides/slide12.xml><?xml version="1.0" encoding="utf-8"?>
+<p:sld xmlns:a="http://schemas.openxmlformats.org/drawingml/2006/main" xmlns:r="http://schemas.openxmlformats.org/officeDocument/2006/relationships" xmlns:p="http://schemas.openxmlformats.org/presentationml/2006/main">
+  <p:cSld>
+    <p:spTree>
+      <p:nvGrpSpPr>
+        <p:cNvPr id="1" name=""/>
+        <p:cNvGrpSpPr/>
+        <p:nvPr/>
+      </p:nvGrpSpPr>
+      <p:grpSpPr>
+        <a:xfrm>
+          <a:off x="0" y="0"/>
+          <a:ext cx="0" cy="0"/>
+          <a:chOff x="0" y="0"/>
+          <a:chExt cx="0" cy="0"/>
+        </a:xfrm>
+      </p:grpSpPr>
+      <p:sp>
+        <p:nvSpPr>
+          <p:cNvPr id="2" name="Title 1"/>
+          <p:cNvSpPr>
+            <a:spLocks noGrp="1"/>
+          </p:cNvSpPr>
+          <p:nvPr>
+            <p:ph type="title"/>
+          </p:nvPr>
+        </p:nvSpPr>
+        <p:spPr/>
+        <p:txBody>
+          <a:bodyPr/>
+          <a:lstStyle/>
+          <a:p>
+            <a:r>
+              <a:rPr lang="en-US" dirty="0"/>
+              <a:t>Merge branch to master</a:t>
+            </a:r>
+          </a:p>
+        </p:txBody>
+      </p:sp>
+      <p:sp>
+        <p:nvSpPr>
+          <p:cNvPr id="3" name="Content Placeholder 2"/>
+          <p:cNvSpPr>
+            <a:spLocks noGrp="1"/>
+          </p:cNvSpPr>
+          <p:nvPr>
+            <p:ph idx="1"/>
+          </p:nvPr>
+        </p:nvSpPr>
+        <p:spPr/>
+        <p:txBody>
+          <a:bodyPr/>
+          <a:lstStyle/>
+          <a:p>
+            <a:r>
+              <a:rPr lang="en-US" dirty="0" err="1">
+                <a:latin typeface="Courier New" panose="02070309020205020404" pitchFamily="49" charset="0"/>
+                <a:cs typeface="Courier New" panose="02070309020205020404" pitchFamily="49" charset="0"/>
+              </a:rPr>
+              <a:t>git</a:t>
+            </a:r>
+            <a:r>
+              <a:rPr lang="en-US" dirty="0">
+                <a:latin typeface="Courier New" panose="02070309020205020404" pitchFamily="49" charset="0"/>
+                <a:cs typeface="Courier New" panose="02070309020205020404" pitchFamily="49" charset="0"/>
+              </a:rPr>
+              <a:t> checkout master </a:t>
+            </a:r>
+            <a:r>
+              <a:rPr lang="en-US" dirty="0"/>
+              <a:t>– switch back to master branch</a:t>
+            </a:r>
+          </a:p>
+          <a:p>
+            <a:pPr lvl="1"/>
+            <a:r>
+              <a:rPr lang="en-US" dirty="0"/>
+              <a:t>Your </a:t>
+            </a:r>
+            <a:r>
+              <a:rPr lang="en-US" dirty="0">
+                <a:latin typeface="Courier New" panose="02070309020205020404" pitchFamily="49" charset="0"/>
+                <a:cs typeface="Courier New" panose="02070309020205020404" pitchFamily="49" charset="0"/>
+              </a:rPr>
+              <a:t>src/helloworld.py </a:t>
+            </a:r>
+            <a:r>
+              <a:rPr lang="en-US" dirty="0"/>
+              <a:t>disappeared! </a:t>
+            </a:r>
+            <a:r>
+              <a:rPr lang="en-US" b="1" dirty="0"/>
+              <a:t>Don’t panic. </a:t>
+            </a:r>
+            <a:r>
+              <a:rPr lang="en-US" dirty="0"/>
+              <a:t>When a branch is checked out you’re seeing repo from that branch’s perspective, and </a:t>
+            </a:r>
+            <a:r>
+              <a:rPr lang="en-US" dirty="0">
+                <a:latin typeface="Courier New" panose="02070309020205020404" pitchFamily="49" charset="0"/>
+                <a:cs typeface="Courier New" panose="02070309020205020404" pitchFamily="49" charset="0"/>
+              </a:rPr>
+              <a:t>master</a:t>
+            </a:r>
+            <a:r>
+              <a:rPr lang="en-US" dirty="0">
+                <a:cs typeface="Courier New" panose="02070309020205020404" pitchFamily="49" charset="0"/>
+              </a:rPr>
+              <a:t> </a:t>
+            </a:r>
+            <a:r>
+              <a:rPr lang="en-US" dirty="0"/>
+              <a:t>branch never had that committed to it.</a:t>
+            </a:r>
+          </a:p>
+          <a:p>
+            <a:pPr lvl="1"/>
+            <a:r>
+              <a:rPr lang="en-US" i="1" dirty="0" err="1">
+                <a:latin typeface="Courier New" panose="02070309020205020404" pitchFamily="49" charset="0"/>
+                <a:cs typeface="Courier New" panose="02070309020205020404" pitchFamily="49" charset="0"/>
+              </a:rPr>
+              <a:t>git</a:t>
+            </a:r>
+            <a:r>
+              <a:rPr lang="en-US" i="1" dirty="0">
+                <a:latin typeface="Courier New" panose="02070309020205020404" pitchFamily="49" charset="0"/>
+                <a:cs typeface="Courier New" panose="02070309020205020404" pitchFamily="49" charset="0"/>
+              </a:rPr>
+              <a:t> checkout develop </a:t>
+            </a:r>
+            <a:r>
+              <a:rPr lang="en-US" i="1" dirty="0"/>
+              <a:t>makes it reappear – guess why?</a:t>
+            </a:r>
+          </a:p>
+          <a:p>
+            <a:r>
+              <a:rPr lang="en-US" dirty="0" err="1">
+                <a:latin typeface="Courier New" panose="02070309020205020404" pitchFamily="49" charset="0"/>
+                <a:cs typeface="Courier New" panose="02070309020205020404" pitchFamily="49" charset="0"/>
+              </a:rPr>
+              <a:t>git</a:t>
+            </a:r>
+            <a:r>
+              <a:rPr lang="en-US" dirty="0">
+                <a:latin typeface="Courier New" panose="02070309020205020404" pitchFamily="49" charset="0"/>
+                <a:cs typeface="Courier New" panose="02070309020205020404" pitchFamily="49" charset="0"/>
+              </a:rPr>
+              <a:t> merge develop –m “merging develop branch into current branch, which is called master”</a:t>
+            </a:r>
+          </a:p>
+          <a:p>
+            <a:pPr lvl="1"/>
+            <a:r>
+              <a:rPr lang="en-US" dirty="0"/>
+              <a:t>This example is a “fast-forward” merge (</a:t>
+            </a:r>
+            <a:r>
+              <a:rPr lang="en-US" b="1" dirty="0"/>
+              <a:t>When to use it, versus other merge types? See </a:t>
+            </a:r>
+            <a:r>
+              <a:rPr lang="en-US" b="1" dirty="0">
+                <a:hlinkClick r:id="rId2"/>
+              </a:rPr>
+              <a:t>www.atlassian.com/git/tutorials/git-merge</a:t>
+            </a:r>
+            <a:r>
+              <a:rPr lang="en-US" dirty="0"/>
+              <a:t>). Thus, it’s not actually a commit and the message you wrote is ignored.</a:t>
+            </a:r>
+          </a:p>
+          <a:p>
+            <a:r>
+              <a:rPr lang="en-US" dirty="0" err="1">
+                <a:latin typeface="Courier New" panose="02070309020205020404" pitchFamily="49" charset="0"/>
+                <a:cs typeface="Courier New" panose="02070309020205020404" pitchFamily="49" charset="0"/>
+              </a:rPr>
+              <a:t>gitk</a:t>
+            </a:r>
+            <a:r>
+              <a:rPr lang="en-US" dirty="0">
+                <a:latin typeface="Courier New" panose="02070309020205020404" pitchFamily="49" charset="0"/>
+                <a:cs typeface="Courier New" panose="02070309020205020404" pitchFamily="49" charset="0"/>
+              </a:rPr>
+              <a:t> --all </a:t>
+            </a:r>
+            <a:r>
+              <a:rPr lang="en-US" dirty="0"/>
+              <a:t>now shows:</a:t>
+            </a:r>
+          </a:p>
+        </p:txBody>
+      </p:sp>
+      <p:pic>
+        <p:nvPicPr>
+          <p:cNvPr id="4" name="Picture 3"/>
+          <p:cNvPicPr>
+            <a:picLocks noChangeAspect="1"/>
+          </p:cNvPicPr>
+          <p:nvPr/>
+        </p:nvPicPr>
+        <p:blipFill rotWithShape="1">
+          <a:blip r:embed="rId3"/>
+          <a:srcRect l="834" t="8890" r="83333" b="82626"/>
+          <a:stretch/>
+        </p:blipFill>
+        <p:spPr>
+          <a:xfrm>
+            <a:off x="4191000" y="5259624"/>
+            <a:ext cx="4038600" cy="1217376"/>
+          </a:xfrm>
+          <a:prstGeom prst="rect">
+            <a:avLst/>
+          </a:prstGeom>
+        </p:spPr>
+      </p:pic>
+    </p:spTree>
+    <p:extLst>
+      <p:ext uri="{BB962C8B-B14F-4D97-AF65-F5344CB8AC3E}">
+        <p14:creationId xmlns:p14="http://schemas.microsoft.com/office/powerpoint/2010/main" val="4162501568"/>
+      </p:ext>
+    </p:extLst>
+  </p:cSld>
+  <p:clrMapOvr>
+    <a:masterClrMapping/>
+  </p:clrMapOvr>
+</p:sld>
+</file>
+
+<file path=ppt/slides/slide13.xml><?xml version="1.0" encoding="utf-8"?>
+<p:sld xmlns:a="http://schemas.openxmlformats.org/drawingml/2006/main" xmlns:r="http://schemas.openxmlformats.org/officeDocument/2006/relationships" xmlns:p="http://schemas.openxmlformats.org/presentationml/2006/main">
+  <p:cSld>
+    <p:spTree>
+      <p:nvGrpSpPr>
+        <p:cNvPr id="1" name=""/>
+        <p:cNvGrpSpPr/>
+        <p:nvPr/>
+      </p:nvGrpSpPr>
+      <p:grpSpPr>
+        <a:xfrm>
+          <a:off x="0" y="0"/>
+          <a:ext cx="0" cy="0"/>
+          <a:chOff x="0" y="0"/>
+          <a:chExt cx="0" cy="0"/>
+        </a:xfrm>
+      </p:grpSpPr>
+      <p:sp>
+        <p:nvSpPr>
+          <p:cNvPr id="2" name="Title 1"/>
+          <p:cNvSpPr>
+            <a:spLocks noGrp="1"/>
+          </p:cNvSpPr>
+          <p:nvPr>
+            <p:ph type="title"/>
+          </p:nvPr>
+        </p:nvSpPr>
+        <p:spPr/>
+        <p:txBody>
+          <a:bodyPr/>
+          <a:lstStyle/>
+          <a:p>
+            <a:r>
+              <a:rPr lang="en-US" sz="3600" dirty="0"/>
+              <a:t>Delete branch &amp; push to </a:t>
+            </a:r>
+            <a:r>
+              <a:rPr lang="en-US" sz="3600" dirty="0" err="1"/>
+              <a:t>Github</a:t>
+            </a:r>
+            <a:r>
+              <a:rPr lang="en-US" sz="3600" dirty="0"/>
+              <a:t> repo</a:t>
+            </a:r>
+          </a:p>
+        </p:txBody>
+      </p:sp>
+      <p:sp>
+        <p:nvSpPr>
+          <p:cNvPr id="3" name="Content Placeholder 2"/>
+          <p:cNvSpPr>
+            <a:spLocks noGrp="1"/>
+          </p:cNvSpPr>
+          <p:nvPr>
+            <p:ph idx="1"/>
+          </p:nvPr>
+        </p:nvSpPr>
+        <p:spPr/>
+        <p:txBody>
+          <a:bodyPr/>
+          <a:lstStyle/>
+          <a:p>
+            <a:r>
+              <a:rPr lang="en-US" dirty="0" err="1">
+                <a:latin typeface="Courier New" panose="02070309020205020404" pitchFamily="49" charset="0"/>
+                <a:cs typeface="Courier New" panose="02070309020205020404" pitchFamily="49" charset="0"/>
+              </a:rPr>
+              <a:t>git</a:t>
+            </a:r>
+            <a:r>
+              <a:rPr lang="en-US" dirty="0">
+                <a:latin typeface="Courier New" panose="02070309020205020404" pitchFamily="49" charset="0"/>
+                <a:cs typeface="Courier New" panose="02070309020205020404" pitchFamily="49" charset="0"/>
+              </a:rPr>
+              <a:t> branch –d develop </a:t>
+            </a:r>
+            <a:r>
+              <a:rPr lang="en-US" dirty="0">
+                <a:cs typeface="Courier New" panose="02070309020205020404" pitchFamily="49" charset="0"/>
+              </a:rPr>
+              <a:t>– delete branch.</a:t>
+            </a:r>
+          </a:p>
+          <a:p>
+            <a:r>
+              <a:rPr lang="en-US" dirty="0" err="1">
+                <a:latin typeface="Courier New" panose="02070309020205020404" pitchFamily="49" charset="0"/>
+                <a:cs typeface="Courier New" panose="02070309020205020404" pitchFamily="49" charset="0"/>
+              </a:rPr>
+              <a:t>gitk</a:t>
+            </a:r>
+            <a:r>
+              <a:rPr lang="en-US" dirty="0">
+                <a:latin typeface="Courier New" panose="02070309020205020404" pitchFamily="49" charset="0"/>
+                <a:cs typeface="Courier New" panose="02070309020205020404" pitchFamily="49" charset="0"/>
+              </a:rPr>
+              <a:t> -–all </a:t>
+            </a:r>
+            <a:r>
+              <a:rPr lang="en-US" dirty="0">
+                <a:cs typeface="Courier New" panose="02070309020205020404" pitchFamily="49" charset="0"/>
+              </a:rPr>
+              <a:t>now shows:</a:t>
+            </a:r>
+          </a:p>
+          <a:p>
+            <a:endParaRPr lang="en-US" dirty="0">
+              <a:cs typeface="Courier New" panose="02070309020205020404" pitchFamily="49" charset="0"/>
+            </a:endParaRPr>
+          </a:p>
+          <a:p>
+            <a:endParaRPr lang="en-US" dirty="0">
+              <a:cs typeface="Courier New" panose="02070309020205020404" pitchFamily="49" charset="0"/>
+            </a:endParaRPr>
+          </a:p>
+          <a:p>
+            <a:endParaRPr lang="en-US" dirty="0">
+              <a:cs typeface="Courier New" panose="02070309020205020404" pitchFamily="49" charset="0"/>
+            </a:endParaRPr>
+          </a:p>
+          <a:p>
+            <a:endParaRPr lang="en-US" dirty="0">
+              <a:cs typeface="Courier New" panose="02070309020205020404" pitchFamily="49" charset="0"/>
+            </a:endParaRPr>
+          </a:p>
+          <a:p>
+            <a:r>
+              <a:rPr lang="en-US" dirty="0" err="1">
+                <a:latin typeface="Courier New" panose="02070309020205020404" pitchFamily="49" charset="0"/>
+                <a:cs typeface="Courier New" panose="02070309020205020404" pitchFamily="49" charset="0"/>
+              </a:rPr>
+              <a:t>git</a:t>
+            </a:r>
+            <a:r>
+              <a:rPr lang="en-US" dirty="0">
+                <a:latin typeface="Courier New" panose="02070309020205020404" pitchFamily="49" charset="0"/>
+                <a:cs typeface="Courier New" panose="02070309020205020404" pitchFamily="49" charset="0"/>
+              </a:rPr>
+              <a:t> remote –v</a:t>
+            </a:r>
+            <a:r>
+              <a:rPr lang="en-US" dirty="0">
+                <a:cs typeface="Courier New" panose="02070309020205020404" pitchFamily="49" charset="0"/>
+              </a:rPr>
+              <a:t> – origin is alias for </a:t>
+            </a:r>
+            <a:r>
+              <a:rPr lang="en-US" dirty="0" err="1">
+                <a:cs typeface="Courier New" panose="02070309020205020404" pitchFamily="49" charset="0"/>
+              </a:rPr>
+              <a:t>Github</a:t>
+            </a:r>
+            <a:r>
+              <a:rPr lang="en-US" dirty="0">
+                <a:cs typeface="Courier New" panose="02070309020205020404" pitchFamily="49" charset="0"/>
+              </a:rPr>
+              <a:t> repo you cloned from</a:t>
+            </a:r>
+          </a:p>
+          <a:p>
+            <a:pPr marL="228600" indent="0">
+              <a:buNone/>
+            </a:pPr>
+            <a:endParaRPr lang="en-US" dirty="0">
+              <a:latin typeface="Courier New" panose="02070309020205020404" pitchFamily="49" charset="0"/>
+              <a:cs typeface="Courier New" panose="02070309020205020404" pitchFamily="49" charset="0"/>
+            </a:endParaRPr>
+          </a:p>
+          <a:p>
+            <a:pPr marL="228600" indent="0">
+              <a:buNone/>
+            </a:pPr>
+            <a:endParaRPr lang="en-US" dirty="0">
+              <a:latin typeface="Courier New" panose="02070309020205020404" pitchFamily="49" charset="0"/>
+              <a:cs typeface="Courier New" panose="02070309020205020404" pitchFamily="49" charset="0"/>
+            </a:endParaRPr>
+          </a:p>
+          <a:p>
+            <a:endParaRPr lang="en-US" dirty="0">
+              <a:latin typeface="Courier New" panose="02070309020205020404" pitchFamily="49" charset="0"/>
+              <a:cs typeface="Courier New" panose="02070309020205020404" pitchFamily="49" charset="0"/>
+            </a:endParaRPr>
+          </a:p>
+          <a:p>
+            <a:r>
+              <a:rPr lang="en-US" dirty="0" err="1">
+                <a:latin typeface="Courier New" panose="02070309020205020404" pitchFamily="49" charset="0"/>
+                <a:cs typeface="Courier New" panose="02070309020205020404" pitchFamily="49" charset="0"/>
+              </a:rPr>
+              <a:t>git</a:t>
+            </a:r>
+            <a:r>
+              <a:rPr lang="en-US" dirty="0">
+                <a:latin typeface="Courier New" panose="02070309020205020404" pitchFamily="49" charset="0"/>
+                <a:cs typeface="Courier New" panose="02070309020205020404" pitchFamily="49" charset="0"/>
+              </a:rPr>
+              <a:t> push origin master </a:t>
+            </a:r>
+            <a:r>
+              <a:rPr lang="en-US" dirty="0">
+                <a:cs typeface="Courier New" panose="02070309020205020404" pitchFamily="49" charset="0"/>
+              </a:rPr>
+              <a:t>- push local branch called “master” to the “master” branch in the remote named “origin”</a:t>
+            </a:r>
+            <a:endParaRPr lang="en-US" dirty="0"/>
+          </a:p>
+        </p:txBody>
+      </p:sp>
+      <p:pic>
+        <p:nvPicPr>
+          <p:cNvPr id="5" name="Picture 4"/>
+          <p:cNvPicPr>
+            <a:picLocks noChangeAspect="1"/>
+          </p:cNvPicPr>
+          <p:nvPr/>
+        </p:nvPicPr>
+        <p:blipFill rotWithShape="1">
+          <a:blip r:embed="rId3"/>
+          <a:srcRect l="834" t="8518" r="83333" b="82593"/>
+          <a:stretch/>
+        </p:blipFill>
+        <p:spPr>
+          <a:xfrm>
+            <a:off x="1981200" y="2209800"/>
+            <a:ext cx="4826000" cy="1524000"/>
+          </a:xfrm>
+          <a:prstGeom prst="rect">
+            <a:avLst/>
+          </a:prstGeom>
+        </p:spPr>
+      </p:pic>
+      <p:pic>
+        <p:nvPicPr>
+          <p:cNvPr id="6" name="Picture 5"/>
+          <p:cNvPicPr>
+            <a:picLocks noChangeAspect="1"/>
+          </p:cNvPicPr>
+          <p:nvPr/>
+        </p:nvPicPr>
+        <p:blipFill rotWithShape="1">
+          <a:blip r:embed="rId4"/>
+          <a:srcRect l="9431" t="45555" r="65833" b="45556"/>
+          <a:stretch/>
+        </p:blipFill>
+        <p:spPr>
+          <a:xfrm>
+            <a:off x="1676399" y="4434732"/>
+            <a:ext cx="5579979" cy="1127868"/>
+          </a:xfrm>
+          <a:prstGeom prst="rect">
+            <a:avLst/>
+          </a:prstGeom>
+        </p:spPr>
+      </p:pic>
+    </p:spTree>
+    <p:extLst>
+      <p:ext uri="{BB962C8B-B14F-4D97-AF65-F5344CB8AC3E}">
+        <p14:creationId xmlns:p14="http://schemas.microsoft.com/office/powerpoint/2010/main" val="819588122"/>
+      </p:ext>
+    </p:extLst>
+  </p:cSld>
+  <p:clrMapOvr>
+    <a:masterClrMapping/>
+  </p:clrMapOvr>
+</p:sld>
+</file>
+
+<file path=ppt/slides/slide14.xml><?xml version="1.0" encoding="utf-8"?>
+<p:sld xmlns:a="http://schemas.openxmlformats.org/drawingml/2006/main" xmlns:r="http://schemas.openxmlformats.org/officeDocument/2006/relationships" xmlns:p="http://schemas.openxmlformats.org/presentationml/2006/main">
+  <p:cSld>
+    <p:spTree>
+      <p:nvGrpSpPr>
+        <p:cNvPr id="1" name=""/>
+        <p:cNvGrpSpPr/>
+        <p:nvPr/>
+      </p:nvGrpSpPr>
+      <p:grpSpPr>
+        <a:xfrm>
+          <a:off x="0" y="0"/>
+          <a:ext cx="0" cy="0"/>
+          <a:chOff x="0" y="0"/>
+          <a:chExt cx="0" cy="0"/>
+        </a:xfrm>
+      </p:grpSpPr>
+      <p:sp>
+        <p:nvSpPr>
+          <p:cNvPr id="2" name="Title 1"/>
+          <p:cNvSpPr>
+            <a:spLocks noGrp="1"/>
+          </p:cNvSpPr>
+          <p:nvPr>
+            <p:ph type="title"/>
+          </p:nvPr>
+        </p:nvSpPr>
+        <p:spPr/>
+        <p:txBody>
+          <a:bodyPr/>
+          <a:lstStyle/>
+          <a:p>
+            <a:r>
+              <a:rPr lang="en-US" dirty="0"/>
               <a:t>View changes in browser</a:t>
+            </a:r>
+          </a:p>
+        </p:txBody>
+      </p:sp>
+      <p:pic>
+        <p:nvPicPr>
+          <p:cNvPr id="7" name="Picture 6"/>
+          <p:cNvPicPr>
+            <a:picLocks noChangeAspect="1"/>
+          </p:cNvPicPr>
+          <p:nvPr/>
+        </p:nvPicPr>
+        <p:blipFill rotWithShape="1">
+          <a:blip r:embed="rId2"/>
+          <a:srcRect l="18333" t="17407" r="19167" b="24814"/>
+          <a:stretch/>
+        </p:blipFill>
+        <p:spPr>
+          <a:xfrm>
+            <a:off x="228600" y="1932432"/>
+            <a:ext cx="8610600" cy="4477512"/>
+          </a:xfrm>
+          <a:prstGeom prst="rect">
+            <a:avLst/>
+          </a:prstGeom>
+        </p:spPr>
+      </p:pic>
+      <p:sp>
+        <p:nvSpPr>
+          <p:cNvPr id="8" name="Content Placeholder 2"/>
+          <p:cNvSpPr txBox="1">
+            <a:spLocks/>
+          </p:cNvSpPr>
+          <p:nvPr/>
+        </p:nvSpPr>
+        <p:spPr bwMode="auto">
+          <a:xfrm>
+            <a:off x="-38100" y="1295400"/>
+            <a:ext cx="9144000" cy="4572000"/>
+          </a:xfrm>
+          <a:prstGeom prst="rect">
+            <a:avLst/>
+          </a:prstGeom>
+          <a:noFill/>
+          <a:ln>
+            <a:noFill/>
+          </a:ln>
+          <a:extLst>
+            <a:ext uri="{909E8E84-426E-40DD-AFC4-6F175D3DCCD1}">
+              <a14:hiddenFill xmlns:a14="http://schemas.microsoft.com/office/drawing/2010/main">
+                <a:solidFill>
+                  <a:srgbClr val="FFFFFF"/>
+                </a:solidFill>
+              </a14:hiddenFill>
+            </a:ext>
+            <a:ext uri="{91240B29-F687-4F45-9708-019B960494DF}">
+              <a14:hiddenLine xmlns:a14="http://schemas.microsoft.com/office/drawing/2010/main" w="9525">
+                <a:solidFill>
+                  <a:srgbClr val="000000"/>
+                </a:solidFill>
+                <a:miter lim="800000"/>
+                <a:headEnd/>
+                <a:tailEnd/>
+              </a14:hiddenLine>
+            </a:ext>
+          </a:extLst>
+        </p:spPr>
+        <p:txBody>
+          <a:bodyPr vert="horz" wrap="square" lIns="91440" tIns="45720" rIns="91440" bIns="45720" numCol="1" anchor="t" anchorCtr="0" compatLnSpc="1">
+            <a:prstTxWarp prst="textNoShape">
+              <a:avLst/>
+            </a:prstTxWarp>
+          </a:bodyPr>
+          <a:lstStyle>
+            <a:lvl1pPr marL="460375" indent="-231775" algn="l" rtl="0" eaLnBrk="0" fontAlgn="base" hangingPunct="0">
+              <a:spcBef>
+                <a:spcPct val="20000"/>
+              </a:spcBef>
+              <a:spcAft>
+                <a:spcPct val="0"/>
+              </a:spcAft>
+              <a:buClr>
+                <a:srgbClr val="BD0901"/>
+              </a:buClr>
+              <a:buSzPct val="100000"/>
+              <a:buChar char="•"/>
+              <a:defRPr sz="2400">
+                <a:solidFill>
+                  <a:schemeClr val="accent4">
+                    <a:lumMod val="85000"/>
+                    <a:lumOff val="15000"/>
+                  </a:schemeClr>
+                </a:solidFill>
+                <a:latin typeface="+mn-lt"/>
+                <a:ea typeface="ＭＳ Ｐゴシック" charset="-128"/>
+                <a:cs typeface="+mn-cs"/>
+              </a:defRPr>
+            </a:lvl1pPr>
+            <a:lvl2pPr marL="854075" indent="-279400" algn="l" rtl="0" eaLnBrk="0" fontAlgn="base" hangingPunct="0">
+              <a:spcBef>
+                <a:spcPct val="20000"/>
+              </a:spcBef>
+              <a:spcAft>
+                <a:spcPct val="0"/>
+              </a:spcAft>
+              <a:buClr>
+                <a:srgbClr val="CC6600"/>
+              </a:buClr>
+              <a:buFont typeface="Wingdings" panose="05000000000000000000" pitchFamily="2" charset="2"/>
+              <a:buChar char="§"/>
+              <a:defRPr sz="2200">
+                <a:solidFill>
+                  <a:schemeClr val="accent4">
+                    <a:lumMod val="75000"/>
+                    <a:lumOff val="25000"/>
+                  </a:schemeClr>
+                </a:solidFill>
+                <a:latin typeface="+mn-lt"/>
+                <a:ea typeface="ＭＳ Ｐゴシック" charset="-128"/>
+              </a:defRPr>
+            </a:lvl2pPr>
+            <a:lvl3pPr marL="1143000" indent="-174625" algn="l" rtl="0" eaLnBrk="0" fontAlgn="base" hangingPunct="0">
+              <a:spcBef>
+                <a:spcPct val="20000"/>
+              </a:spcBef>
+              <a:spcAft>
+                <a:spcPct val="0"/>
+              </a:spcAft>
+              <a:buClr>
+                <a:srgbClr val="FFC000"/>
+              </a:buClr>
+              <a:buChar char="•"/>
+              <a:defRPr sz="2000">
+                <a:solidFill>
+                  <a:srgbClr val="4D4D4D"/>
+                </a:solidFill>
+                <a:latin typeface="+mn-lt"/>
+                <a:ea typeface="ＭＳ Ｐゴシック" charset="-128"/>
+              </a:defRPr>
+            </a:lvl3pPr>
+            <a:lvl4pPr marL="1430338" indent="-173038" algn="l" rtl="0" eaLnBrk="0" fontAlgn="base" hangingPunct="0">
+              <a:spcBef>
+                <a:spcPct val="20000"/>
+              </a:spcBef>
+              <a:spcAft>
+                <a:spcPct val="0"/>
+              </a:spcAft>
+              <a:buClr>
+                <a:srgbClr val="796646"/>
+              </a:buClr>
+              <a:buFont typeface="Wingdings" panose="05000000000000000000" pitchFamily="2" charset="2"/>
+              <a:buChar char="§"/>
+              <a:defRPr sz="2000">
+                <a:solidFill>
+                  <a:srgbClr val="4D4D4D"/>
+                </a:solidFill>
+                <a:latin typeface="+mn-lt"/>
+                <a:ea typeface="ＭＳ Ｐゴシック" charset="-128"/>
+              </a:defRPr>
+            </a:lvl4pPr>
+            <a:lvl5pPr marL="1765300" indent="-220663" algn="l" rtl="0" eaLnBrk="0" fontAlgn="base" hangingPunct="0">
+              <a:spcBef>
+                <a:spcPct val="20000"/>
+              </a:spcBef>
+              <a:spcAft>
+                <a:spcPct val="0"/>
+              </a:spcAft>
+              <a:buChar char="»"/>
+              <a:defRPr sz="2000">
+                <a:solidFill>
+                  <a:srgbClr val="4D4D4D"/>
+                </a:solidFill>
+                <a:latin typeface="+mn-lt"/>
+                <a:ea typeface="ＭＳ Ｐゴシック" charset="-128"/>
+              </a:defRPr>
+            </a:lvl5pPr>
+            <a:lvl6pPr marL="2222500" indent="-220663" algn="l" rtl="0" fontAlgn="base">
+              <a:spcBef>
+                <a:spcPct val="20000"/>
+              </a:spcBef>
+              <a:spcAft>
+                <a:spcPct val="0"/>
+              </a:spcAft>
+              <a:buChar char="»"/>
+              <a:defRPr>
+                <a:solidFill>
+                  <a:srgbClr val="4D4D4D"/>
+                </a:solidFill>
+                <a:latin typeface="+mn-lt"/>
+              </a:defRPr>
+            </a:lvl6pPr>
+            <a:lvl7pPr marL="2679700" indent="-220663" algn="l" rtl="0" fontAlgn="base">
+              <a:spcBef>
+                <a:spcPct val="20000"/>
+              </a:spcBef>
+              <a:spcAft>
+                <a:spcPct val="0"/>
+              </a:spcAft>
+              <a:buChar char="»"/>
+              <a:defRPr>
+                <a:solidFill>
+                  <a:srgbClr val="4D4D4D"/>
+                </a:solidFill>
+                <a:latin typeface="+mn-lt"/>
+              </a:defRPr>
+            </a:lvl7pPr>
+            <a:lvl8pPr marL="3136900" indent="-220663" algn="l" rtl="0" fontAlgn="base">
+              <a:spcBef>
+                <a:spcPct val="20000"/>
+              </a:spcBef>
+              <a:spcAft>
+                <a:spcPct val="0"/>
+              </a:spcAft>
+              <a:buChar char="»"/>
+              <a:defRPr>
+                <a:solidFill>
+                  <a:srgbClr val="4D4D4D"/>
+                </a:solidFill>
+                <a:latin typeface="+mn-lt"/>
+              </a:defRPr>
+            </a:lvl8pPr>
+            <a:lvl9pPr marL="3594100" indent="-220663" algn="l" rtl="0" fontAlgn="base">
+              <a:spcBef>
+                <a:spcPct val="20000"/>
+              </a:spcBef>
+              <a:spcAft>
+                <a:spcPct val="0"/>
+              </a:spcAft>
+              <a:buChar char="»"/>
+              <a:defRPr>
+                <a:solidFill>
+                  <a:srgbClr val="4D4D4D"/>
+                </a:solidFill>
+                <a:latin typeface="+mn-lt"/>
+              </a:defRPr>
+            </a:lvl9pPr>
+          </a:lstStyle>
+          <a:p>
+            <a:r>
+              <a:rPr lang="en-US" kern="0" dirty="0">
+                <a:cs typeface="Courier New" panose="02070309020205020404" pitchFamily="49" charset="0"/>
+              </a:rPr>
+              <a:t>Your online repo now has the </a:t>
+            </a:r>
+            <a:r>
+              <a:rPr lang="en-US" kern="0" dirty="0">
+                <a:latin typeface="Courier New" panose="02070309020205020404" pitchFamily="49" charset="0"/>
+                <a:cs typeface="Courier New" panose="02070309020205020404" pitchFamily="49" charset="0"/>
+              </a:rPr>
+              <a:t>src/helloworld.py</a:t>
+            </a:r>
+            <a:r>
+              <a:rPr lang="en-US" kern="0" dirty="0">
+                <a:cs typeface="Courier New" panose="02070309020205020404" pitchFamily="49" charset="0"/>
+              </a:rPr>
+              <a:t> file</a:t>
+            </a:r>
+          </a:p>
+        </p:txBody>
+      </p:sp>
+      <p:sp>
+        <p:nvSpPr>
+          <p:cNvPr id="10" name="Oval 9"/>
+          <p:cNvSpPr/>
+          <p:nvPr/>
+        </p:nvSpPr>
+        <p:spPr bwMode="auto">
+          <a:xfrm>
+            <a:off x="228600" y="4988011"/>
+            <a:ext cx="685799" cy="498389"/>
+          </a:xfrm>
+          <a:prstGeom prst="ellipse">
+            <a:avLst/>
+          </a:prstGeom>
+          <a:noFill/>
+          <a:ln w="50800" cap="flat" cmpd="sng" algn="ctr">
+            <a:solidFill>
+              <a:srgbClr val="FF0000"/>
+            </a:solidFill>
+            <a:prstDash val="solid"/>
+            <a:round/>
+            <a:headEnd type="none" w="med" len="med"/>
+            <a:tailEnd type="none" w="med" len="med"/>
+          </a:ln>
+          <a:effectLst/>
+        </p:spPr>
+        <p:txBody>
+          <a:bodyPr vert="horz" wrap="square" lIns="91440" tIns="45720" rIns="91440" bIns="45720" numCol="1" rtlCol="0" anchor="t" anchorCtr="0" compatLnSpc="1">
+            <a:prstTxWarp prst="textNoShape">
+              <a:avLst/>
+            </a:prstTxWarp>
+          </a:bodyPr>
+          <a:lstStyle/>
+          <a:p>
+            <a:pPr marL="0" marR="0" indent="0" algn="r" defTabSz="914400" rtl="0" eaLnBrk="1" fontAlgn="base" latinLnBrk="0" hangingPunct="1">
+              <a:lnSpc>
+                <a:spcPct val="100000"/>
+              </a:lnSpc>
+              <a:spcBef>
+                <a:spcPct val="0"/>
+              </a:spcBef>
+              <a:spcAft>
+                <a:spcPct val="0"/>
+              </a:spcAft>
+              <a:buClrTx/>
+              <a:buSzTx/>
+              <a:buFontTx/>
+              <a:buNone/>
+              <a:tabLst/>
+            </a:pPr>
+            <a:endParaRPr kumimoji="0" lang="en-US" sz="1800" b="0" i="0" u="none" strike="noStrike" cap="none" normalizeH="0" baseline="0">
+              <a:ln>
+                <a:noFill/>
+              </a:ln>
+              <a:solidFill>
+                <a:schemeClr val="tx1"/>
+              </a:solidFill>
+              <a:effectLst/>
+              <a:latin typeface="Arial" charset="0"/>
+            </a:endParaRPr>
+          </a:p>
+        </p:txBody>
+      </p:sp>
+      <p:cxnSp>
+        <p:nvCxnSpPr>
+          <p:cNvPr id="12" name="Straight Arrow Connector 11"/>
+          <p:cNvCxnSpPr/>
+          <p:nvPr/>
+        </p:nvCxnSpPr>
+        <p:spPr bwMode="auto">
+          <a:xfrm flipH="1">
+            <a:off x="914399" y="1752600"/>
+            <a:ext cx="3429001" cy="3235411"/>
+          </a:xfrm>
+          <a:prstGeom prst="straightConnector1">
+            <a:avLst/>
+          </a:prstGeom>
+          <a:solidFill>
+            <a:schemeClr val="accent1"/>
+          </a:solidFill>
+          <a:ln w="9525" cap="flat" cmpd="sng" algn="ctr">
+            <a:solidFill>
+              <a:schemeClr val="tx1"/>
+            </a:solidFill>
+            <a:prstDash val="solid"/>
+            <a:round/>
+            <a:headEnd type="none" w="med" len="med"/>
+            <a:tailEnd type="triangle"/>
+          </a:ln>
+          <a:effectLst/>
+        </p:spPr>
+      </p:cxnSp>
+    </p:spTree>
+    <p:extLst>
+      <p:ext uri="{BB962C8B-B14F-4D97-AF65-F5344CB8AC3E}">
+        <p14:creationId xmlns:p14="http://schemas.microsoft.com/office/powerpoint/2010/main" val="765651127"/>
+      </p:ext>
+    </p:extLst>
+  </p:cSld>
+  <p:clrMapOvr>
+    <a:masterClrMapping/>
+  </p:clrMapOvr>
+</p:sld>
+</file>
+
+<file path=ppt/slides/slide15.xml><?xml version="1.0" encoding="utf-8"?>
+<p:sld xmlns:a="http://schemas.openxmlformats.org/drawingml/2006/main" xmlns:r="http://schemas.openxmlformats.org/officeDocument/2006/relationships" xmlns:p="http://schemas.openxmlformats.org/presentationml/2006/main">
+  <p:cSld>
+    <p:spTree>
+      <p:nvGrpSpPr>
+        <p:cNvPr id="1" name=""/>
+        <p:cNvGrpSpPr/>
+        <p:nvPr/>
+      </p:nvGrpSpPr>
+      <p:grpSpPr>
+        <a:xfrm>
+          <a:off x="0" y="0"/>
+          <a:ext cx="0" cy="0"/>
+          <a:chOff x="0" y="0"/>
+          <a:chExt cx="0" cy="0"/>
+        </a:xfrm>
+      </p:grpSpPr>
+      <p:sp>
+        <p:nvSpPr>
+          <p:cNvPr id="2" name="Title 1"/>
+          <p:cNvSpPr>
+            <a:spLocks noGrp="1"/>
+          </p:cNvSpPr>
+          <p:nvPr>
+            <p:ph type="title"/>
+          </p:nvPr>
+        </p:nvSpPr>
+        <p:spPr/>
+        <p:txBody>
+          <a:bodyPr/>
+          <a:lstStyle/>
+          <a:p>
+            <a:r>
+              <a:rPr lang="en-US" dirty="0"/>
+              <a:t>View code changes in browser</a:t>
             </a:r>
           </a:p>
         </p:txBody>
@@ -6079,18 +7610,74 @@
           </a:p>
           <a:p>
             <a:r>
+              <a:rPr lang="en-US" dirty="0">
+                <a:cs typeface="Courier New" panose="02070309020205020404" pitchFamily="49" charset="0"/>
+              </a:rPr>
+              <a:t>Above is from a more complicated example</a:t>
+            </a:r>
+          </a:p>
+          <a:p>
+            <a:r>
+              <a:rPr lang="en-US" dirty="0">
+                <a:cs typeface="Courier New" panose="02070309020205020404" pitchFamily="49" charset="0"/>
+              </a:rPr>
+              <a:t>Can also use </a:t>
+            </a:r>
+            <a:r>
+              <a:rPr lang="en-US" dirty="0" err="1">
+                <a:latin typeface="Courier New" panose="02070309020205020404" pitchFamily="49" charset="0"/>
+                <a:cs typeface="Courier New" panose="02070309020205020404" pitchFamily="49" charset="0"/>
+              </a:rPr>
+              <a:t>git</a:t>
+            </a:r>
+            <a:r>
+              <a:rPr lang="en-US" dirty="0">
+                <a:latin typeface="Courier New" panose="02070309020205020404" pitchFamily="49" charset="0"/>
+                <a:cs typeface="Courier New" panose="02070309020205020404" pitchFamily="49" charset="0"/>
+              </a:rPr>
+              <a:t> diff </a:t>
+            </a:r>
+            <a:r>
+              <a:rPr lang="en-US" dirty="0">
+                <a:cs typeface="Courier New" panose="02070309020205020404" pitchFamily="49" charset="0"/>
+              </a:rPr>
+              <a:t>to see in command line</a:t>
+            </a:r>
+            <a:endParaRPr lang="en-US" kern="0" dirty="0">
+              <a:cs typeface="Courier New" panose="02070309020205020404" pitchFamily="49" charset="0"/>
+              <a:hlinkClick r:id="rId3"/>
+            </a:endParaRPr>
+          </a:p>
+          <a:p>
+            <a:r>
               <a:rPr lang="en-US" kern="0" dirty="0">
                 <a:cs typeface="Courier New" panose="02070309020205020404" pitchFamily="49" charset="0"/>
                 <a:hlinkClick r:id="rId3"/>
               </a:rPr>
-              <a:t>stackoverflow.com/questions/2529441/how-to-read-the-output-from-git-diff</a:t>
+              <a:t>stackoverflow.com/questions/2529441/how-to-read-the-output-from-</a:t>
+            </a:r>
+            <a:r>
+              <a:rPr lang="en-US" kern="0" dirty="0" err="1">
+                <a:cs typeface="Courier New" panose="02070309020205020404" pitchFamily="49" charset="0"/>
+                <a:hlinkClick r:id="rId3"/>
+              </a:rPr>
+              <a:t>git</a:t>
             </a:r>
             <a:r>
               <a:rPr lang="en-US" kern="0" dirty="0">
                 <a:cs typeface="Courier New" panose="02070309020205020404" pitchFamily="49" charset="0"/>
+                <a:hlinkClick r:id="rId3"/>
+              </a:rPr>
+              <a:t>-diff</a:t>
+            </a:r>
+            <a:r>
+              <a:rPr lang="en-US" kern="0" dirty="0">
+                <a:cs typeface="Courier New" panose="02070309020205020404" pitchFamily="49" charset="0"/>
               </a:rPr>
               <a:t> </a:t>
             </a:r>
+          </a:p>
+          <a:p>
             <a:endParaRPr lang="en-US" kern="0" dirty="0">
               <a:cs typeface="Courier New" panose="02070309020205020404" pitchFamily="49" charset="0"/>
             </a:endParaRPr>
@@ -6100,7 +7687,7 @@
     </p:spTree>
     <p:extLst>
       <p:ext uri="{BB962C8B-B14F-4D97-AF65-F5344CB8AC3E}">
-        <p14:creationId xmlns:p14="http://schemas.microsoft.com/office/powerpoint/2010/main" val="765651127"/>
+        <p14:creationId xmlns:p14="http://schemas.microsoft.com/office/powerpoint/2010/main" val="980703721"/>
       </p:ext>
     </p:extLst>
   </p:cSld>
@@ -6110,7 +7697,7 @@
 </p:sld>
 </file>
 
-<file path=ppt/slides/slide12.xml><?xml version="1.0" encoding="utf-8"?>
+<file path=ppt/slides/slide16.xml><?xml version="1.0" encoding="utf-8"?>
 <p:sld xmlns:a="http://schemas.openxmlformats.org/drawingml/2006/main" xmlns:r="http://schemas.openxmlformats.org/officeDocument/2006/relationships" xmlns:p="http://schemas.openxmlformats.org/presentationml/2006/main">
   <p:cSld>
     <p:spTree>
@@ -6129,12 +7716,15 @@
       </p:grpSpPr>
       <p:sp>
         <p:nvSpPr>
-          <p:cNvPr id="2" name="Title 1"/>
+          <p:cNvPr id="5122" name="Rectangle 2"/>
           <p:cNvSpPr>
-            <a:spLocks noGrp="1"/>
-          </p:cNvSpPr>
-          <p:nvPr>
-            <p:ph type="title"/>
+            <a:spLocks noGrp="1" noChangeArrowheads="1"/>
+          </p:cNvSpPr>
+          <p:nvPr>
+            <p:ph type="ctrTitle"/>
+            <p:custDataLst>
+              <p:tags r:id="rId1"/>
+            </p:custDataLst>
           </p:nvPr>
         </p:nvSpPr>
         <p:spPr/>
@@ -6143,192 +7733,18 @@
           <a:lstStyle/>
           <a:p>
             <a:r>
-              <a:rPr lang="en-US" sz="4000" dirty="0"/>
-              <a:t>Undo mistakes (</a:t>
-            </a:r>
-            <a:r>
-              <a:rPr lang="en-US" sz="4000" i="1" dirty="0"/>
-              <a:t>only use locally</a:t>
-            </a:r>
-            <a:r>
-              <a:rPr lang="en-US" sz="4000" dirty="0"/>
-              <a:t>)</a:t>
-            </a:r>
-          </a:p>
-        </p:txBody>
-      </p:sp>
-      <p:sp>
-        <p:nvSpPr>
-          <p:cNvPr id="3" name="Content Placeholder 2"/>
-          <p:cNvSpPr>
-            <a:spLocks noGrp="1"/>
-          </p:cNvSpPr>
-          <p:nvPr>
-            <p:ph idx="1"/>
-          </p:nvPr>
-        </p:nvSpPr>
-        <p:spPr/>
-        <p:txBody>
-          <a:bodyPr/>
-          <a:lstStyle/>
-          <a:p>
-            <a:r>
-              <a:rPr lang="en-US" dirty="0">
-                <a:hlinkClick r:id="rId3"/>
-              </a:rPr>
-              <a:t>github.com/blog/2019-how-to-undo-almost-anything-with-git</a:t>
-            </a:r>
-            <a:r>
-              <a:rPr lang="en-US" dirty="0"/>
-              <a:t> </a:t>
-            </a:r>
-          </a:p>
-          <a:p>
-            <a:r>
-              <a:rPr lang="en-US" dirty="0"/>
-              <a:t>Restore a single file</a:t>
-            </a:r>
-          </a:p>
-          <a:p>
-            <a:pPr lvl="1"/>
-            <a:r>
-              <a:rPr lang="en-US" dirty="0" err="1">
-                <a:latin typeface="Courier New" panose="02070309020205020404" pitchFamily="49" charset="0"/>
-                <a:cs typeface="Courier New" panose="02070309020205020404" pitchFamily="49" charset="0"/>
-              </a:rPr>
-              <a:t>git</a:t>
-            </a:r>
-            <a:r>
-              <a:rPr lang="en-US" dirty="0">
-                <a:latin typeface="Courier New" panose="02070309020205020404" pitchFamily="49" charset="0"/>
-                <a:cs typeface="Courier New" panose="02070309020205020404" pitchFamily="49" charset="0"/>
-              </a:rPr>
-              <a:t> log –</a:t>
-            </a:r>
-            <a:r>
-              <a:rPr lang="en-US" dirty="0" err="1">
-                <a:latin typeface="Courier New" panose="02070309020205020404" pitchFamily="49" charset="0"/>
-                <a:cs typeface="Courier New" panose="02070309020205020404" pitchFamily="49" charset="0"/>
-              </a:rPr>
-              <a:t>oneline</a:t>
-            </a:r>
-            <a:r>
-              <a:rPr lang="en-US" dirty="0">
-                <a:latin typeface="Courier New" panose="02070309020205020404" pitchFamily="49" charset="0"/>
-                <a:cs typeface="Courier New" panose="02070309020205020404" pitchFamily="49" charset="0"/>
-              </a:rPr>
-              <a:t> </a:t>
-            </a:r>
-            <a:r>
-              <a:rPr lang="en-US" dirty="0">
-                <a:cs typeface="Courier New" panose="02070309020205020404" pitchFamily="49" charset="0"/>
-              </a:rPr>
-              <a:t>– view identifiers for prior commits</a:t>
-            </a:r>
-          </a:p>
-          <a:p>
-            <a:pPr lvl="1"/>
-            <a:r>
-              <a:rPr lang="en-US" dirty="0" err="1">
-                <a:latin typeface="Courier New" panose="02070309020205020404" pitchFamily="49" charset="0"/>
-                <a:cs typeface="Courier New" panose="02070309020205020404" pitchFamily="49" charset="0"/>
-              </a:rPr>
-              <a:t>git</a:t>
-            </a:r>
-            <a:r>
-              <a:rPr lang="en-US" dirty="0">
-                <a:latin typeface="Courier New" panose="02070309020205020404" pitchFamily="49" charset="0"/>
-                <a:cs typeface="Courier New" panose="02070309020205020404" pitchFamily="49" charset="0"/>
-              </a:rPr>
-              <a:t> checkout c6fab02 src/helloworld.py </a:t>
-            </a:r>
-            <a:r>
-              <a:rPr lang="en-US" dirty="0">
-                <a:cs typeface="Courier New" panose="02070309020205020404" pitchFamily="49" charset="0"/>
-              </a:rPr>
-              <a:t>– restore old version of file from previous commit</a:t>
-            </a:r>
-          </a:p>
-          <a:p>
-            <a:pPr lvl="1"/>
-            <a:r>
-              <a:rPr lang="en-US" dirty="0" err="1">
-                <a:latin typeface="Courier New" panose="02070309020205020404" pitchFamily="49" charset="0"/>
-                <a:cs typeface="Courier New" panose="02070309020205020404" pitchFamily="49" charset="0"/>
-              </a:rPr>
-              <a:t>git</a:t>
-            </a:r>
-            <a:r>
-              <a:rPr lang="en-US" dirty="0">
-                <a:latin typeface="Courier New" panose="02070309020205020404" pitchFamily="49" charset="0"/>
-                <a:cs typeface="Courier New" panose="02070309020205020404" pitchFamily="49" charset="0"/>
-              </a:rPr>
-              <a:t> commit –a –m “restore helloworld.py from commit c6fab02”</a:t>
-            </a:r>
-          </a:p>
-          <a:p>
-            <a:r>
-              <a:rPr lang="en-US" dirty="0"/>
-              <a:t>Restore everything to where it was after a previous commit, as if previous commits never happened (</a:t>
-            </a:r>
-            <a:r>
-              <a:rPr lang="en-US" i="1" dirty="0"/>
-              <a:t>use with caution</a:t>
-            </a:r>
-            <a:r>
-              <a:rPr lang="en-US" dirty="0"/>
-              <a:t>).</a:t>
-            </a:r>
-            <a:endParaRPr lang="en-US" i="1" dirty="0"/>
-          </a:p>
-          <a:p>
-            <a:pPr lvl="1"/>
-            <a:r>
-              <a:rPr lang="en-US" dirty="0" err="1">
-                <a:latin typeface="Courier New" panose="02070309020205020404" pitchFamily="49" charset="0"/>
-                <a:cs typeface="Courier New" panose="02070309020205020404" pitchFamily="49" charset="0"/>
-              </a:rPr>
-              <a:t>git</a:t>
-            </a:r>
-            <a:r>
-              <a:rPr lang="en-US" dirty="0">
-                <a:latin typeface="Courier New" panose="02070309020205020404" pitchFamily="49" charset="0"/>
-                <a:cs typeface="Courier New" panose="02070309020205020404" pitchFamily="49" charset="0"/>
-              </a:rPr>
-              <a:t> reset --hard c6fab02</a:t>
-            </a:r>
-            <a:endParaRPr lang="en-US" dirty="0"/>
-          </a:p>
-          <a:p>
-            <a:pPr marL="228600" indent="0">
-              <a:buNone/>
-            </a:pPr>
-            <a:endParaRPr lang="en-US" dirty="0"/>
-          </a:p>
-          <a:p>
-            <a:r>
-              <a:rPr lang="en-US" i="1" dirty="0"/>
-              <a:t>For undoing commits pushed to </a:t>
-            </a:r>
-            <a:r>
-              <a:rPr lang="en-US" i="1" dirty="0" err="1"/>
-              <a:t>Github</a:t>
-            </a:r>
-            <a:r>
-              <a:rPr lang="en-US" i="1" dirty="0"/>
-              <a:t>, safest to just fix it locally and push a new commit.</a:t>
-            </a:r>
-            <a:endParaRPr lang="en-US" dirty="0">
-              <a:latin typeface="Courier New" panose="02070309020205020404" pitchFamily="49" charset="0"/>
-              <a:cs typeface="Courier New" panose="02070309020205020404" pitchFamily="49" charset="0"/>
-            </a:endParaRPr>
+              <a:rPr lang="en-US" altLang="en-US" dirty="0">
+                <a:ea typeface="ＭＳ Ｐゴシック" panose="020B0600070205080204" pitchFamily="34" charset="-128"/>
+              </a:rPr>
+              <a:t>More to learn!</a:t>
+            </a:r>
           </a:p>
         </p:txBody>
       </p:sp>
     </p:spTree>
     <p:extLst>
       <p:ext uri="{BB962C8B-B14F-4D97-AF65-F5344CB8AC3E}">
-        <p14:creationId xmlns:p14="http://schemas.microsoft.com/office/powerpoint/2010/main" val="3853678109"/>
+        <p14:creationId xmlns:p14="http://schemas.microsoft.com/office/powerpoint/2010/main" val="2827058586"/>
       </p:ext>
     </p:extLst>
   </p:cSld>
@@ -6338,7 +7754,7 @@
 </p:sld>
 </file>
 
-<file path=ppt/slides/slide13.xml><?xml version="1.0" encoding="utf-8"?>
+<file path=ppt/slides/slide17.xml><?xml version="1.0" encoding="utf-8"?>
 <p:sld xmlns:a="http://schemas.openxmlformats.org/drawingml/2006/main" xmlns:r="http://schemas.openxmlformats.org/officeDocument/2006/relationships" xmlns:p="http://schemas.openxmlformats.org/presentationml/2006/main">
   <p:cSld>
     <p:spTree>
@@ -6371,10 +7787,17 @@
           <a:lstStyle/>
           <a:p>
             <a:r>
-              <a:rPr lang="en-US"/>
-              <a:t>Merge branch to master</a:t>
-            </a:r>
-            <a:endParaRPr lang="en-US"/>
+              <a:rPr lang="en-US" sz="4000" dirty="0"/>
+              <a:t>Undo mistakes (</a:t>
+            </a:r>
+            <a:r>
+              <a:rPr lang="en-US" sz="4000" i="1" dirty="0"/>
+              <a:t>only use locally</a:t>
+            </a:r>
+            <a:r>
+              <a:rPr lang="en-US" sz="4000" dirty="0"/>
+              <a:t>)</a:t>
+            </a:r>
           </a:p>
         </p:txBody>
       </p:sp>
@@ -6388,19 +7811,270 @@
             <p:ph idx="1"/>
           </p:nvPr>
         </p:nvSpPr>
-        <p:spPr/>
+        <p:spPr>
+          <a:xfrm>
+            <a:off x="0" y="1143000"/>
+            <a:ext cx="9144000" cy="4572000"/>
+          </a:xfrm>
+        </p:spPr>
         <p:txBody>
           <a:bodyPr/>
           <a:lstStyle/>
           <a:p>
-            <a:endParaRPr lang="en-US"/>
+            <a:r>
+              <a:rPr lang="en-US" dirty="0">
+                <a:hlinkClick r:id="rId3"/>
+              </a:rPr>
+              <a:t>github.com/blog/2019-how-to-undo-almost-anything-with-git</a:t>
+            </a:r>
+            <a:r>
+              <a:rPr lang="en-US" dirty="0"/>
+              <a:t> </a:t>
+            </a:r>
+          </a:p>
+          <a:p>
+            <a:r>
+              <a:rPr lang="en-US" dirty="0"/>
+              <a:t>Restore a single file (</a:t>
+            </a:r>
+            <a:r>
+              <a:rPr lang="en-US" i="1" dirty="0"/>
+              <a:t>use with caution</a:t>
+            </a:r>
+            <a:r>
+              <a:rPr lang="en-US" dirty="0"/>
+              <a:t>)</a:t>
+            </a:r>
+          </a:p>
+          <a:p>
+            <a:pPr lvl="1"/>
+            <a:r>
+              <a:rPr lang="en-US" dirty="0" err="1">
+                <a:latin typeface="Courier New" panose="02070309020205020404" pitchFamily="49" charset="0"/>
+                <a:cs typeface="Courier New" panose="02070309020205020404" pitchFamily="49" charset="0"/>
+              </a:rPr>
+              <a:t>git</a:t>
+            </a:r>
+            <a:r>
+              <a:rPr lang="en-US" dirty="0">
+                <a:latin typeface="Courier New" panose="02070309020205020404" pitchFamily="49" charset="0"/>
+                <a:cs typeface="Courier New" panose="02070309020205020404" pitchFamily="49" charset="0"/>
+              </a:rPr>
+              <a:t> log –</a:t>
+            </a:r>
+            <a:r>
+              <a:rPr lang="en-US" dirty="0" err="1">
+                <a:latin typeface="Courier New" panose="02070309020205020404" pitchFamily="49" charset="0"/>
+                <a:cs typeface="Courier New" panose="02070309020205020404" pitchFamily="49" charset="0"/>
+              </a:rPr>
+              <a:t>oneline</a:t>
+            </a:r>
+            <a:r>
+              <a:rPr lang="en-US" dirty="0">
+                <a:latin typeface="Courier New" panose="02070309020205020404" pitchFamily="49" charset="0"/>
+                <a:cs typeface="Courier New" panose="02070309020205020404" pitchFamily="49" charset="0"/>
+              </a:rPr>
+              <a:t> </a:t>
+            </a:r>
+            <a:r>
+              <a:rPr lang="en-US" dirty="0">
+                <a:cs typeface="Courier New" panose="02070309020205020404" pitchFamily="49" charset="0"/>
+              </a:rPr>
+              <a:t>– view identifiers for prior commits</a:t>
+            </a:r>
+          </a:p>
+          <a:p>
+            <a:pPr lvl="1"/>
+            <a:r>
+              <a:rPr lang="en-US" dirty="0" err="1">
+                <a:latin typeface="Courier New" panose="02070309020205020404" pitchFamily="49" charset="0"/>
+                <a:cs typeface="Courier New" panose="02070309020205020404" pitchFamily="49" charset="0"/>
+              </a:rPr>
+              <a:t>git</a:t>
+            </a:r>
+            <a:r>
+              <a:rPr lang="en-US" dirty="0">
+                <a:latin typeface="Courier New" panose="02070309020205020404" pitchFamily="49" charset="0"/>
+                <a:cs typeface="Courier New" panose="02070309020205020404" pitchFamily="49" charset="0"/>
+              </a:rPr>
+              <a:t> checkout </a:t>
+            </a:r>
+            <a:r>
+              <a:rPr lang="en-US" b="1" dirty="0">
+                <a:latin typeface="Courier New" panose="02070309020205020404" pitchFamily="49" charset="0"/>
+                <a:cs typeface="Courier New" panose="02070309020205020404" pitchFamily="49" charset="0"/>
+              </a:rPr>
+              <a:t>c6fab02</a:t>
+            </a:r>
+            <a:r>
+              <a:rPr lang="en-US" dirty="0">
+                <a:latin typeface="Courier New" panose="02070309020205020404" pitchFamily="49" charset="0"/>
+                <a:cs typeface="Courier New" panose="02070309020205020404" pitchFamily="49" charset="0"/>
+              </a:rPr>
+              <a:t> src/helloworld.py </a:t>
+            </a:r>
+            <a:r>
+              <a:rPr lang="en-US" dirty="0">
+                <a:cs typeface="Courier New" panose="02070309020205020404" pitchFamily="49" charset="0"/>
+              </a:rPr>
+              <a:t>– restore old version of file from previous commit</a:t>
+            </a:r>
+          </a:p>
+          <a:p>
+            <a:pPr lvl="1"/>
+            <a:r>
+              <a:rPr lang="en-US" dirty="0" err="1">
+                <a:latin typeface="Courier New" panose="02070309020205020404" pitchFamily="49" charset="0"/>
+                <a:cs typeface="Courier New" panose="02070309020205020404" pitchFamily="49" charset="0"/>
+              </a:rPr>
+              <a:t>git</a:t>
+            </a:r>
+            <a:r>
+              <a:rPr lang="en-US" dirty="0">
+                <a:latin typeface="Courier New" panose="02070309020205020404" pitchFamily="49" charset="0"/>
+                <a:cs typeface="Courier New" panose="02070309020205020404" pitchFamily="49" charset="0"/>
+              </a:rPr>
+              <a:t> commit –a –m “restore helloworld.py from commit that had SHA </a:t>
+            </a:r>
+            <a:r>
+              <a:rPr lang="en-US" b="1" dirty="0">
+                <a:latin typeface="Courier New" panose="02070309020205020404" pitchFamily="49" charset="0"/>
+                <a:cs typeface="Courier New" panose="02070309020205020404" pitchFamily="49" charset="0"/>
+              </a:rPr>
+              <a:t>c6fab02</a:t>
+            </a:r>
+            <a:r>
+              <a:rPr lang="en-US" dirty="0">
+                <a:latin typeface="Courier New" panose="02070309020205020404" pitchFamily="49" charset="0"/>
+                <a:cs typeface="Courier New" panose="02070309020205020404" pitchFamily="49" charset="0"/>
+              </a:rPr>
+              <a:t>”</a:t>
+            </a:r>
+          </a:p>
+          <a:p>
+            <a:r>
+              <a:rPr lang="en-US" dirty="0"/>
+              <a:t>Restore everything to where it was after a previous commit, as if later commits never happened (</a:t>
+            </a:r>
+            <a:r>
+              <a:rPr lang="en-US" i="1" dirty="0"/>
+              <a:t>use with caution</a:t>
+            </a:r>
+            <a:r>
+              <a:rPr lang="en-US" dirty="0"/>
+              <a:t>).</a:t>
+            </a:r>
+            <a:endParaRPr lang="en-US" i="1" dirty="0"/>
+          </a:p>
+          <a:p>
+            <a:pPr lvl="1"/>
+            <a:r>
+              <a:rPr lang="en-US" dirty="0" err="1">
+                <a:latin typeface="Courier New" panose="02070309020205020404" pitchFamily="49" charset="0"/>
+                <a:cs typeface="Courier New" panose="02070309020205020404" pitchFamily="49" charset="0"/>
+              </a:rPr>
+              <a:t>git</a:t>
+            </a:r>
+            <a:r>
+              <a:rPr lang="en-US" dirty="0">
+                <a:latin typeface="Courier New" panose="02070309020205020404" pitchFamily="49" charset="0"/>
+                <a:cs typeface="Courier New" panose="02070309020205020404" pitchFamily="49" charset="0"/>
+              </a:rPr>
+              <a:t> reset --hard </a:t>
+            </a:r>
+            <a:r>
+              <a:rPr lang="en-US" b="1" dirty="0">
+                <a:latin typeface="Courier New" panose="02070309020205020404" pitchFamily="49" charset="0"/>
+                <a:cs typeface="Courier New" panose="02070309020205020404" pitchFamily="49" charset="0"/>
+              </a:rPr>
+              <a:t>c6fab02</a:t>
+            </a:r>
+          </a:p>
+          <a:p>
+            <a:r>
+              <a:rPr lang="en-US" dirty="0">
+                <a:cs typeface="Courier New" panose="02070309020205020404" pitchFamily="49" charset="0"/>
+              </a:rPr>
+              <a:t>Make a new branch starting at a previous commit</a:t>
+            </a:r>
+          </a:p>
+          <a:p>
+            <a:pPr lvl="1"/>
+            <a:r>
+              <a:rPr lang="en-US" dirty="0" err="1">
+                <a:latin typeface="Courier New" panose="02070309020205020404" pitchFamily="49" charset="0"/>
+                <a:cs typeface="Courier New" panose="02070309020205020404" pitchFamily="49" charset="0"/>
+              </a:rPr>
+              <a:t>git</a:t>
+            </a:r>
+            <a:r>
+              <a:rPr lang="en-US" dirty="0">
+                <a:latin typeface="Courier New" panose="02070309020205020404" pitchFamily="49" charset="0"/>
+                <a:cs typeface="Courier New" panose="02070309020205020404" pitchFamily="49" charset="0"/>
+              </a:rPr>
+              <a:t> checkout </a:t>
+            </a:r>
+            <a:r>
+              <a:rPr lang="en-US" b="1" dirty="0">
+                <a:latin typeface="Courier New" panose="02070309020205020404" pitchFamily="49" charset="0"/>
+                <a:cs typeface="Courier New" panose="02070309020205020404" pitchFamily="49" charset="0"/>
+              </a:rPr>
+              <a:t>c6fab02</a:t>
+            </a:r>
+            <a:r>
+              <a:rPr lang="en-US" dirty="0">
+                <a:latin typeface="Courier New" panose="02070309020205020404" pitchFamily="49" charset="0"/>
+                <a:cs typeface="Courier New" panose="02070309020205020404" pitchFamily="49" charset="0"/>
+              </a:rPr>
+              <a:t>; </a:t>
+            </a:r>
+            <a:r>
+              <a:rPr lang="en-US" dirty="0" err="1">
+                <a:latin typeface="Courier New" panose="02070309020205020404" pitchFamily="49" charset="0"/>
+                <a:cs typeface="Courier New" panose="02070309020205020404" pitchFamily="49" charset="0"/>
+              </a:rPr>
+              <a:t>git</a:t>
+            </a:r>
+            <a:r>
+              <a:rPr lang="en-US" dirty="0">
+                <a:latin typeface="Courier New" panose="02070309020205020404" pitchFamily="49" charset="0"/>
+                <a:cs typeface="Courier New" panose="02070309020205020404" pitchFamily="49" charset="0"/>
+              </a:rPr>
+              <a:t> checkout –b </a:t>
+            </a:r>
+            <a:r>
+              <a:rPr lang="en-US" dirty="0" err="1">
+                <a:latin typeface="Courier New" panose="02070309020205020404" pitchFamily="49" charset="0"/>
+                <a:cs typeface="Courier New" panose="02070309020205020404" pitchFamily="49" charset="0"/>
+              </a:rPr>
+              <a:t>mybranch</a:t>
+            </a:r>
+            <a:endParaRPr lang="en-US" dirty="0"/>
+          </a:p>
+          <a:p>
+            <a:r>
+              <a:rPr lang="en-US" i="1" dirty="0"/>
+              <a:t>For undoing commits pushed to </a:t>
+            </a:r>
+            <a:r>
+              <a:rPr lang="en-US" i="1" dirty="0" err="1"/>
+              <a:t>Github</a:t>
+            </a:r>
+            <a:r>
+              <a:rPr lang="en-US" i="1" dirty="0"/>
+              <a:t>, safest to just fix it locally and push a new commit.</a:t>
+            </a:r>
+            <a:endParaRPr lang="en-US" dirty="0">
+              <a:latin typeface="Courier New" panose="02070309020205020404" pitchFamily="49" charset="0"/>
+              <a:cs typeface="Courier New" panose="02070309020205020404" pitchFamily="49" charset="0"/>
+            </a:endParaRPr>
           </a:p>
         </p:txBody>
       </p:sp>
     </p:spTree>
     <p:extLst>
       <p:ext uri="{BB962C8B-B14F-4D97-AF65-F5344CB8AC3E}">
-        <p14:creationId xmlns:p14="http://schemas.microsoft.com/office/powerpoint/2010/main" val="4162501568"/>
+        <p14:creationId xmlns:p14="http://schemas.microsoft.com/office/powerpoint/2010/main" val="3853678109"/>
       </p:ext>
     </p:extLst>
   </p:cSld>
@@ -6410,7 +8084,7 @@
 </p:sld>
 </file>
 
-<file path=ppt/slides/slide14.xml><?xml version="1.0" encoding="utf-8"?>
+<file path=ppt/slides/slide18.xml><?xml version="1.0" encoding="utf-8"?>
 <p:sld xmlns:a="http://schemas.openxmlformats.org/drawingml/2006/main" xmlns:r="http://schemas.openxmlformats.org/officeDocument/2006/relationships" xmlns:p="http://schemas.openxmlformats.org/presentationml/2006/main">
   <p:cSld>
     <p:spTree>
@@ -6476,125 +8150,44 @@
                 <a:latin typeface="Courier New" panose="02070309020205020404" pitchFamily="49" charset="0"/>
                 <a:cs typeface="Courier New" panose="02070309020205020404" pitchFamily="49" charset="0"/>
               </a:rPr>
-              <a:t> pull</a:t>
-            </a:r>
-          </a:p>
-          <a:p>
-            <a:r>
-              <a:rPr lang="en-US" dirty="0" err="1">
-                <a:latin typeface="Courier New" panose="02070309020205020404" pitchFamily="49" charset="0"/>
-                <a:cs typeface="Courier New" panose="02070309020205020404" pitchFamily="49" charset="0"/>
-              </a:rPr>
-              <a:t>git</a:t>
-            </a:r>
-            <a:r>
-              <a:rPr lang="en-US" dirty="0">
-                <a:latin typeface="Courier New" panose="02070309020205020404" pitchFamily="49" charset="0"/>
-                <a:cs typeface="Courier New" panose="02070309020205020404" pitchFamily="49" charset="0"/>
-              </a:rPr>
-              <a:t> fetch</a:t>
-            </a:r>
-          </a:p>
-          <a:p>
-            <a:r>
-              <a:rPr lang="en-US" dirty="0" err="1">
-                <a:latin typeface="Courier New" panose="02070309020205020404" pitchFamily="49" charset="0"/>
-                <a:cs typeface="Courier New" panose="02070309020205020404" pitchFamily="49" charset="0"/>
-              </a:rPr>
-              <a:t>git</a:t>
-            </a:r>
-            <a:r>
-              <a:rPr lang="en-US" dirty="0">
-                <a:latin typeface="Courier New" panose="02070309020205020404" pitchFamily="49" charset="0"/>
-                <a:cs typeface="Courier New" panose="02070309020205020404" pitchFamily="49" charset="0"/>
-              </a:rPr>
-              <a:t> merge</a:t>
+              <a:t> remote/fetch/merge/push/pull/tag</a:t>
             </a:r>
           </a:p>
           <a:p>
             <a:r>
               <a:rPr lang="en-US" dirty="0"/>
-              <a:t>Issues</a:t>
-            </a:r>
-          </a:p>
-          <a:p>
-            <a:r>
-              <a:rPr lang="en-US" dirty="0"/>
-              <a:t>Branches &amp; merging</a:t>
-            </a:r>
-          </a:p>
-          <a:p>
-            <a:r>
-              <a:rPr lang="en-US" dirty="0"/>
-              <a:t>Forks &amp; pull requests</a:t>
-            </a:r>
-          </a:p>
-          <a:p>
-            <a:endParaRPr lang="en-US" dirty="0"/>
+              <a:t>Issues, branches, forks, merging, rebasing, pull requests, ...</a:t>
+            </a:r>
           </a:p>
         </p:txBody>
       </p:sp>
+      <p:pic>
+        <p:nvPicPr>
+          <p:cNvPr id="4" name="Picture 3"/>
+          <p:cNvPicPr>
+            <a:picLocks noChangeAspect="1"/>
+          </p:cNvPicPr>
+          <p:nvPr/>
+        </p:nvPicPr>
+        <p:blipFill rotWithShape="1">
+          <a:blip r:embed="rId2"/>
+          <a:srcRect t="17255"/>
+          <a:stretch/>
+        </p:blipFill>
+        <p:spPr>
+          <a:xfrm>
+            <a:off x="1113387" y="2133600"/>
+            <a:ext cx="7192413" cy="4463527"/>
+          </a:xfrm>
+          <a:prstGeom prst="rect">
+            <a:avLst/>
+          </a:prstGeom>
+        </p:spPr>
+      </p:pic>
     </p:spTree>
     <p:extLst>
       <p:ext uri="{BB962C8B-B14F-4D97-AF65-F5344CB8AC3E}">
         <p14:creationId xmlns:p14="http://schemas.microsoft.com/office/powerpoint/2010/main" val="967433549"/>
-      </p:ext>
-    </p:extLst>
-  </p:cSld>
-  <p:clrMapOvr>
-    <a:masterClrMapping/>
-  </p:clrMapOvr>
-</p:sld>
-</file>
-
-<file path=ppt/slides/slide15.xml><?xml version="1.0" encoding="utf-8"?>
-<p:sld xmlns:a="http://schemas.openxmlformats.org/drawingml/2006/main" xmlns:r="http://schemas.openxmlformats.org/officeDocument/2006/relationships" xmlns:p="http://schemas.openxmlformats.org/presentationml/2006/main">
-  <p:cSld>
-    <p:spTree>
-      <p:nvGrpSpPr>
-        <p:cNvPr id="1" name=""/>
-        <p:cNvGrpSpPr/>
-        <p:nvPr/>
-      </p:nvGrpSpPr>
-      <p:grpSpPr>
-        <a:xfrm>
-          <a:off x="0" y="0"/>
-          <a:ext cx="0" cy="0"/>
-          <a:chOff x="0" y="0"/>
-          <a:chExt cx="0" cy="0"/>
-        </a:xfrm>
-      </p:grpSpPr>
-      <p:sp>
-        <p:nvSpPr>
-          <p:cNvPr id="5122" name="Rectangle 2"/>
-          <p:cNvSpPr>
-            <a:spLocks noGrp="1" noChangeArrowheads="1"/>
-          </p:cNvSpPr>
-          <p:nvPr>
-            <p:ph type="ctrTitle"/>
-            <p:custDataLst>
-              <p:tags r:id="rId1"/>
-            </p:custDataLst>
-          </p:nvPr>
-        </p:nvSpPr>
-        <p:spPr/>
-        <p:txBody>
-          <a:bodyPr/>
-          <a:lstStyle/>
-          <a:p>
-            <a:r>
-              <a:rPr lang="en-US" altLang="en-US" dirty="0">
-                <a:ea typeface="ＭＳ Ｐゴシック" panose="020B0600070205080204" pitchFamily="34" charset="-128"/>
-              </a:rPr>
-              <a:t>Much more to learn!</a:t>
-            </a:r>
-          </a:p>
-        </p:txBody>
-      </p:sp>
-    </p:spTree>
-    <p:extLst>
-      <p:ext uri="{BB962C8B-B14F-4D97-AF65-F5344CB8AC3E}">
-        <p14:creationId xmlns:p14="http://schemas.microsoft.com/office/powerpoint/2010/main" val="2827058586"/>
       </p:ext>
     </p:extLst>
   </p:cSld>
@@ -6704,14 +8297,14 @@
             <a:pPr lvl="1"/>
             <a:r>
               <a:rPr lang="en-US" dirty="0"/>
-              <a:t>Work on different parts, at different times, in different locations, then merge changes smoothly</a:t>
+              <a:t>Distributed: work on different parts, at different times, in different locations, then merge changes smoothly</a:t>
             </a:r>
           </a:p>
           <a:p>
             <a:pPr lvl="1"/>
             <a:r>
               <a:rPr lang="en-US" dirty="0"/>
-              <a:t>Complete project archive &amp; documentation</a:t>
+              <a:t>Complete project history &amp; documentation</a:t>
             </a:r>
           </a:p>
           <a:p>
@@ -6762,12 +8355,15 @@
       </p:grpSpPr>
       <p:sp>
         <p:nvSpPr>
-          <p:cNvPr id="2" name="Title 1"/>
+          <p:cNvPr id="5122" name="Rectangle 2"/>
           <p:cNvSpPr>
-            <a:spLocks noGrp="1"/>
-          </p:cNvSpPr>
-          <p:nvPr>
-            <p:ph type="title"/>
+            <a:spLocks noGrp="1" noChangeArrowheads="1"/>
+          </p:cNvSpPr>
+          <p:nvPr>
+            <p:ph type="ctrTitle"/>
+            <p:custDataLst>
+              <p:tags r:id="rId1"/>
+            </p:custDataLst>
           </p:nvPr>
         </p:nvSpPr>
         <p:spPr/>
@@ -6776,105 +8372,30 @@
           <a:lstStyle/>
           <a:p>
             <a:r>
-              <a:rPr lang="en-US" dirty="0"/>
-              <a:t>High-level concept</a:t>
-            </a:r>
-          </a:p>
-        </p:txBody>
-      </p:sp>
-      <p:pic>
-        <p:nvPicPr>
-          <p:cNvPr id="4" name="Picture 2" descr="simple workflow"/>
-          <p:cNvPicPr>
-            <a:picLocks noChangeAspect="1" noChangeArrowheads="1"/>
-          </p:cNvPicPr>
-          <p:nvPr/>
-        </p:nvPicPr>
-        <p:blipFill>
-          <a:blip r:embed="rId2">
-            <a:extLst>
-              <a:ext uri="{28A0092B-C50C-407E-A947-70E740481C1C}">
-                <a14:useLocalDpi xmlns:a14="http://schemas.microsoft.com/office/drawing/2010/main" val="0"/>
-              </a:ext>
-            </a:extLst>
-          </a:blip>
-          <a:srcRect/>
-          <a:stretch>
-            <a:fillRect/>
-          </a:stretch>
-        </p:blipFill>
-        <p:spPr bwMode="auto">
-          <a:xfrm>
-            <a:off x="685800" y="1295400"/>
-            <a:ext cx="3276600" cy="4876200"/>
-          </a:xfrm>
-          <a:prstGeom prst="rect">
-            <a:avLst/>
-          </a:prstGeom>
-          <a:noFill/>
-          <a:extLst>
-            <a:ext uri="{909E8E84-426E-40DD-AFC4-6F175D3DCCD1}">
-              <a14:hiddenFill xmlns:a14="http://schemas.microsoft.com/office/drawing/2010/main">
-                <a:solidFill>
-                  <a:srgbClr val="FFFFFF"/>
-                </a:solidFill>
-              </a14:hiddenFill>
-            </a:ext>
-          </a:extLst>
-        </p:spPr>
-      </p:pic>
-      <p:sp>
-        <p:nvSpPr>
-          <p:cNvPr id="5" name="TextBox 4"/>
-          <p:cNvSpPr txBox="1"/>
-          <p:nvPr/>
-        </p:nvSpPr>
-        <p:spPr>
-          <a:xfrm>
-            <a:off x="3352800" y="2971800"/>
-            <a:ext cx="5314275" cy="369332"/>
-          </a:xfrm>
-          <a:prstGeom prst="rect">
-            <a:avLst/>
-          </a:prstGeom>
-          <a:noFill/>
-        </p:spPr>
-        <p:txBody>
-          <a:bodyPr wrap="none" rtlCol="0">
-            <a:spAutoFit/>
-          </a:bodyPr>
-          <a:lstStyle/>
-          <a:p>
-            <a:r>
-              <a:rPr lang="en-US" dirty="0">
-                <a:hlinkClick r:id="rId3"/>
-              </a:rPr>
-              <a:t>nvie.com/posts/a-successful-</a:t>
-            </a:r>
-            <a:r>
-              <a:rPr lang="en-US" dirty="0" err="1">
-                <a:hlinkClick r:id="rId3"/>
-              </a:rPr>
-              <a:t>git</a:t>
-            </a:r>
-            <a:r>
-              <a:rPr lang="en-US" dirty="0">
-                <a:hlinkClick r:id="rId3"/>
-              </a:rPr>
-              <a:t>-branching-model/</a:t>
-            </a:r>
-            <a:r>
-              <a:rPr lang="en-US" dirty="0"/>
-              <a:t> </a:t>
-            </a:r>
-            <a:endParaRPr lang="en-US" dirty="0"/>
+              <a:rPr lang="en-US" altLang="en-US" dirty="0">
+                <a:ea typeface="ＭＳ Ｐゴシック" panose="020B0600070205080204" pitchFamily="34" charset="-128"/>
+              </a:rPr>
+              <a:t>Example: one-user, one-branch </a:t>
+            </a:r>
+            <a:r>
+              <a:rPr lang="en-US" altLang="en-US" dirty="0" err="1">
+                <a:ea typeface="ＭＳ Ｐゴシック" panose="020B0600070205080204" pitchFamily="34" charset="-128"/>
+              </a:rPr>
+              <a:t>Github</a:t>
+            </a:r>
+            <a:r>
+              <a:rPr lang="en-US" altLang="en-US" dirty="0">
+                <a:ea typeface="ＭＳ Ｐゴシック" panose="020B0600070205080204" pitchFamily="34" charset="-128"/>
+              </a:rPr>
+              <a:t> pipeline</a:t>
+            </a:r>
           </a:p>
         </p:txBody>
       </p:sp>
     </p:spTree>
     <p:extLst>
       <p:ext uri="{BB962C8B-B14F-4D97-AF65-F5344CB8AC3E}">
-        <p14:creationId xmlns:p14="http://schemas.microsoft.com/office/powerpoint/2010/main" val="2431716478"/>
+        <p14:creationId xmlns:p14="http://schemas.microsoft.com/office/powerpoint/2010/main" val="258595419"/>
       </p:ext>
     </p:extLst>
   </p:cSld>
@@ -6903,15 +8424,12 @@
       </p:grpSpPr>
       <p:sp>
         <p:nvSpPr>
-          <p:cNvPr id="5122" name="Rectangle 2"/>
+          <p:cNvPr id="2" name="Title 1"/>
           <p:cNvSpPr>
-            <a:spLocks noGrp="1" noChangeArrowheads="1"/>
-          </p:cNvSpPr>
-          <p:nvPr>
-            <p:ph type="ctrTitle"/>
-            <p:custDataLst>
-              <p:tags r:id="rId1"/>
-            </p:custDataLst>
+            <a:spLocks noGrp="1"/>
+          </p:cNvSpPr>
+          <p:nvPr>
+            <p:ph type="title"/>
           </p:nvPr>
         </p:nvSpPr>
         <p:spPr/>
@@ -6920,30 +8438,46 @@
           <a:lstStyle/>
           <a:p>
             <a:r>
-              <a:rPr lang="en-US" altLang="en-US" dirty="0">
-                <a:ea typeface="ＭＳ Ｐゴシック" panose="020B0600070205080204" pitchFamily="34" charset="-128"/>
-              </a:rPr>
-              <a:t>One-user, one-branch </a:t>
-            </a:r>
-            <a:r>
-              <a:rPr lang="en-US" altLang="en-US" dirty="0" err="1">
-                <a:ea typeface="ＭＳ Ｐゴシック" panose="020B0600070205080204" pitchFamily="34" charset="-128"/>
-              </a:rPr>
-              <a:t>Github</a:t>
-            </a:r>
-            <a:r>
-              <a:rPr lang="en-US" altLang="en-US" dirty="0">
-                <a:ea typeface="ＭＳ Ｐゴシック" panose="020B0600070205080204" pitchFamily="34" charset="-128"/>
-              </a:rPr>
-              <a:t> pipeline</a:t>
+              <a:rPr lang="en-US" dirty="0"/>
+              <a:t>What we’re doing, high-level</a:t>
             </a:r>
           </a:p>
         </p:txBody>
       </p:sp>
+      <p:pic>
+        <p:nvPicPr>
+          <p:cNvPr id="12" name="Picture 11"/>
+          <p:cNvPicPr>
+            <a:picLocks noChangeAspect="1"/>
+          </p:cNvPicPr>
+          <p:nvPr/>
+        </p:nvPicPr>
+        <p:blipFill>
+          <a:blip r:embed="rId3">
+            <a:extLst>
+              <a:ext uri="{28A0092B-C50C-407E-A947-70E740481C1C}">
+                <a14:useLocalDpi xmlns:a14="http://schemas.microsoft.com/office/drawing/2010/main" val="0"/>
+              </a:ext>
+            </a:extLst>
+          </a:blip>
+          <a:stretch>
+            <a:fillRect/>
+          </a:stretch>
+        </p:blipFill>
+        <p:spPr>
+          <a:xfrm>
+            <a:off x="1143000" y="1304925"/>
+            <a:ext cx="7315200" cy="5172075"/>
+          </a:xfrm>
+          <a:prstGeom prst="rect">
+            <a:avLst/>
+          </a:prstGeom>
+        </p:spPr>
+      </p:pic>
     </p:spTree>
     <p:extLst>
       <p:ext uri="{BB962C8B-B14F-4D97-AF65-F5344CB8AC3E}">
-        <p14:creationId xmlns:p14="http://schemas.microsoft.com/office/powerpoint/2010/main" val="258595419"/>
+        <p14:creationId xmlns:p14="http://schemas.microsoft.com/office/powerpoint/2010/main" val="2431716478"/>
       </p:ext>
     </p:extLst>
   </p:cSld>
@@ -7026,23 +8560,13 @@
               <a:rPr lang="en-US" dirty="0">
                 <a:hlinkClick r:id="rId4"/>
               </a:rPr>
-              <a:t>swcarpentry.github.io/</a:t>
+              <a:t>github.com/lahoffm/</a:t>
             </a:r>
             <a:r>
               <a:rPr lang="en-US" dirty="0" err="1">
                 <a:hlinkClick r:id="rId4"/>
               </a:rPr>
-              <a:t>git</a:t>
-            </a:r>
-            <a:r>
-              <a:rPr lang="en-US" dirty="0">
-                <a:hlinkClick r:id="rId4"/>
-              </a:rPr>
-              <a:t>-novice/</a:t>
-            </a:r>
-            <a:r>
-              <a:rPr lang="en-US" dirty="0"/>
-              <a:t> </a:t>
+              <a:t>github_help</a:t>
             </a:r>
             <a:endParaRPr lang="en-US" dirty="0"/>
           </a:p>
@@ -7103,7 +8627,7 @@
             </a:r>
             <a:r>
               <a:rPr lang="en-US" dirty="0"/>
-              <a:t> Bash (Windows)</a:t>
+              <a:t> Bash is great (Windows)</a:t>
             </a:r>
           </a:p>
           <a:p>
@@ -7139,7 +8663,25 @@
               <a:rPr lang="en-US" dirty="0"/>
               <a:t> </a:t>
             </a:r>
-            <a:endParaRPr lang="en-US" dirty="0"/>
+          </a:p>
+          <a:p>
+            <a:pPr lvl="1">
+              <a:defRPr/>
+            </a:pPr>
+            <a:r>
+              <a:rPr lang="en-US" dirty="0" err="1">
+                <a:latin typeface="Courier New" panose="02070309020205020404" pitchFamily="49" charset="0"/>
+                <a:cs typeface="Courier New" panose="02070309020205020404" pitchFamily="49" charset="0"/>
+              </a:rPr>
+              <a:t>git</a:t>
+            </a:r>
+            <a:r>
+              <a:rPr lang="en-US" dirty="0">
+                <a:latin typeface="Courier New" panose="02070309020205020404" pitchFamily="49" charset="0"/>
+                <a:cs typeface="Courier New" panose="02070309020205020404" pitchFamily="49" charset="0"/>
+              </a:rPr>
+              <a:t> help</a:t>
+            </a:r>
           </a:p>
           <a:p>
             <a:pPr>
@@ -7232,7 +8774,7 @@
         <p:spPr>
           <a:xfrm>
             <a:off x="685800" y="1204783"/>
-            <a:ext cx="3284151" cy="5140411"/>
+            <a:ext cx="3429000" cy="5367131"/>
           </a:xfrm>
           <a:prstGeom prst="rect">
             <a:avLst/>
@@ -7254,7 +8796,7 @@
         </p:blipFill>
         <p:spPr>
           <a:xfrm>
-            <a:off x="5334000" y="1204783"/>
+            <a:off x="5574163" y="1204783"/>
             <a:ext cx="2884037" cy="5359126"/>
           </a:xfrm>
           <a:prstGeom prst="rect">
@@ -7270,7 +8812,7 @@
         </p:nvSpPr>
         <p:spPr bwMode="auto">
           <a:xfrm>
-            <a:off x="2513913" y="3449593"/>
+            <a:off x="2590113" y="3540211"/>
             <a:ext cx="1372287" cy="650789"/>
           </a:xfrm>
           <a:prstGeom prst="ellipse">
@@ -7333,7 +8875,7 @@
         </p:nvSpPr>
         <p:spPr bwMode="auto">
           <a:xfrm>
-            <a:off x="7154959" y="1524000"/>
+            <a:off x="7364627" y="1524000"/>
             <a:ext cx="1017373" cy="650789"/>
           </a:xfrm>
           <a:prstGeom prst="ellipse">
@@ -7388,6 +8930,139 @@
           </a:p>
         </p:txBody>
       </p:sp>
+      <p:sp>
+        <p:nvSpPr>
+          <p:cNvPr id="3" name="TextBox 2"/>
+          <p:cNvSpPr txBox="1"/>
+          <p:nvPr/>
+        </p:nvSpPr>
+        <p:spPr>
+          <a:xfrm>
+            <a:off x="3886200" y="5434564"/>
+            <a:ext cx="1608133" cy="923330"/>
+          </a:xfrm>
+          <a:prstGeom prst="rect">
+            <a:avLst/>
+          </a:prstGeom>
+          <a:noFill/>
+        </p:spPr>
+        <p:txBody>
+          <a:bodyPr wrap="none" rtlCol="0">
+            <a:spAutoFit/>
+          </a:bodyPr>
+          <a:lstStyle/>
+          <a:p>
+            <a:pPr algn="ctr"/>
+            <a:r>
+              <a:rPr lang="en-US" b="1" dirty="0"/>
+              <a:t>Or </a:t>
+            </a:r>
+            <a:r>
+              <a:rPr lang="en-US" b="1" dirty="0" err="1">
+                <a:latin typeface="Courier New" panose="02070309020205020404" pitchFamily="49" charset="0"/>
+                <a:cs typeface="Courier New" panose="02070309020205020404" pitchFamily="49" charset="0"/>
+              </a:rPr>
+              <a:t>git</a:t>
+            </a:r>
+            <a:r>
+              <a:rPr lang="en-US" b="1" dirty="0">
+                <a:latin typeface="Courier New" panose="02070309020205020404" pitchFamily="49" charset="0"/>
+                <a:cs typeface="Courier New" panose="02070309020205020404" pitchFamily="49" charset="0"/>
+              </a:rPr>
+              <a:t> </a:t>
+            </a:r>
+            <a:r>
+              <a:rPr lang="en-US" b="1" dirty="0" err="1">
+                <a:latin typeface="Courier New" panose="02070309020205020404" pitchFamily="49" charset="0"/>
+                <a:cs typeface="Courier New" panose="02070309020205020404" pitchFamily="49" charset="0"/>
+              </a:rPr>
+              <a:t>init</a:t>
+            </a:r>
+            <a:endParaRPr lang="en-US" b="1" dirty="0">
+              <a:latin typeface="Courier New" panose="02070309020205020404" pitchFamily="49" charset="0"/>
+              <a:cs typeface="Courier New" panose="02070309020205020404" pitchFamily="49" charset="0"/>
+            </a:endParaRPr>
+          </a:p>
+          <a:p>
+            <a:pPr algn="ctr"/>
+            <a:r>
+              <a:rPr lang="en-US" b="1" dirty="0">
+                <a:latin typeface="+mn-lt"/>
+                <a:cs typeface="Courier New" panose="02070309020205020404" pitchFamily="49" charset="0"/>
+              </a:rPr>
+              <a:t>with a few</a:t>
+            </a:r>
+          </a:p>
+          <a:p>
+            <a:pPr algn="ctr"/>
+            <a:r>
+              <a:rPr lang="en-US" b="1" dirty="0">
+                <a:latin typeface="+mn-lt"/>
+                <a:cs typeface="Courier New" panose="02070309020205020404" pitchFamily="49" charset="0"/>
+              </a:rPr>
+              <a:t>more steps</a:t>
+            </a:r>
+          </a:p>
+        </p:txBody>
+      </p:sp>
+      <p:cxnSp>
+        <p:nvCxnSpPr>
+          <p:cNvPr id="9" name="Straight Arrow Connector 8"/>
+          <p:cNvCxnSpPr/>
+          <p:nvPr/>
+        </p:nvCxnSpPr>
+        <p:spPr bwMode="auto">
+          <a:xfrm>
+            <a:off x="3810000" y="4191000"/>
+            <a:ext cx="762000" cy="1066800"/>
+          </a:xfrm>
+          <a:prstGeom prst="straightConnector1">
+            <a:avLst/>
+          </a:prstGeom>
+          <a:solidFill>
+            <a:schemeClr val="accent1"/>
+          </a:solidFill>
+          <a:ln w="9525" cap="flat" cmpd="sng" algn="ctr">
+            <a:solidFill>
+              <a:schemeClr val="tx1"/>
+            </a:solidFill>
+            <a:prstDash val="solid"/>
+            <a:round/>
+            <a:headEnd type="none" w="med" len="med"/>
+            <a:tailEnd type="triangle"/>
+          </a:ln>
+          <a:effectLst/>
+        </p:spPr>
+      </p:cxnSp>
+      <p:cxnSp>
+        <p:nvCxnSpPr>
+          <p:cNvPr id="10" name="Straight Arrow Connector 9"/>
+          <p:cNvCxnSpPr/>
+          <p:nvPr/>
+        </p:nvCxnSpPr>
+        <p:spPr bwMode="auto">
+          <a:xfrm flipH="1">
+            <a:off x="5116963" y="2174789"/>
+            <a:ext cx="2350638" cy="3083011"/>
+          </a:xfrm>
+          <a:prstGeom prst="straightConnector1">
+            <a:avLst/>
+          </a:prstGeom>
+          <a:solidFill>
+            <a:schemeClr val="accent1"/>
+          </a:solidFill>
+          <a:ln w="9525" cap="flat" cmpd="sng" algn="ctr">
+            <a:solidFill>
+              <a:schemeClr val="tx1"/>
+            </a:solidFill>
+            <a:prstDash val="solid"/>
+            <a:round/>
+            <a:headEnd type="none" w="med" len="med"/>
+            <a:tailEnd type="triangle"/>
+          </a:ln>
+          <a:effectLst/>
+        </p:spPr>
+      </p:cxnSp>
     </p:spTree>
     <p:extLst>
       <p:ext uri="{BB962C8B-B14F-4D97-AF65-F5344CB8AC3E}">
@@ -7484,7 +9159,6 @@
               <a:rPr lang="en-US" dirty="0"/>
               <a:t> </a:t>
             </a:r>
-            <a:endParaRPr lang="en-US" dirty="0"/>
           </a:p>
           <a:p>
             <a:r>
@@ -7584,7 +9258,19 @@
               <a:rPr lang="en-US" dirty="0">
                 <a:cs typeface="Courier New" panose="02070309020205020404" pitchFamily="49" charset="0"/>
               </a:rPr>
-              <a:t>On command line</a:t>
+              <a:t>On command line (or </a:t>
+            </a:r>
+            <a:r>
+              <a:rPr lang="en-US" dirty="0" err="1">
+                <a:cs typeface="Courier New" panose="02070309020205020404" pitchFamily="49" charset="0"/>
+              </a:rPr>
+              <a:t>Git</a:t>
+            </a:r>
+            <a:r>
+              <a:rPr lang="en-US" dirty="0">
+                <a:cs typeface="Courier New" panose="02070309020205020404" pitchFamily="49" charset="0"/>
+              </a:rPr>
+              <a:t> Bash)</a:t>
             </a:r>
           </a:p>
           <a:p>
@@ -7624,6 +9310,27 @@
                 <a:hlinkClick r:id="rId4"/>
               </a:rPr>
               <a:t>https://github.com/username/reponame</a:t>
+            </a:r>
+            <a:endParaRPr lang="en-US" dirty="0">
+              <a:latin typeface="Courier New" panose="02070309020205020404" pitchFamily="49" charset="0"/>
+              <a:cs typeface="Courier New" panose="02070309020205020404" pitchFamily="49" charset="0"/>
+            </a:endParaRPr>
+          </a:p>
+          <a:p>
+            <a:pPr lvl="1"/>
+            <a:r>
+              <a:rPr lang="en-US" dirty="0">
+                <a:latin typeface="Courier New" panose="02070309020205020404" pitchFamily="49" charset="0"/>
+                <a:cs typeface="Courier New" panose="02070309020205020404" pitchFamily="49" charset="0"/>
+              </a:rPr>
+              <a:t>cd </a:t>
+            </a:r>
+            <a:r>
+              <a:rPr lang="en-US" dirty="0" err="1">
+                <a:latin typeface="Courier New" panose="02070309020205020404" pitchFamily="49" charset="0"/>
+                <a:cs typeface="Courier New" panose="02070309020205020404" pitchFamily="49" charset="0"/>
+              </a:rPr>
+              <a:t>reponame</a:t>
             </a:r>
             <a:endParaRPr lang="en-US" dirty="0">
               <a:latin typeface="Courier New" panose="02070309020205020404" pitchFamily="49" charset="0"/>
@@ -7726,52 +9433,223 @@
           <a:lstStyle/>
           <a:p>
             <a:r>
+              <a:rPr lang="en-US" dirty="0" err="1">
+                <a:latin typeface="Courier New" panose="02070309020205020404" pitchFamily="49" charset="0"/>
+                <a:cs typeface="Courier New" panose="02070309020205020404" pitchFamily="49" charset="0"/>
+              </a:rPr>
+              <a:t>git</a:t>
+            </a:r>
+            <a:r>
               <a:rPr lang="en-US" dirty="0">
-                <a:hlinkClick r:id="rId2"/>
-              </a:rPr>
-              <a:t>https://www.gun.io/blog/how-to-github-fork-branch-and-pull-request</a:t>
-            </a:r>
-            <a:r>
-              <a:rPr lang="en-US" dirty="0"/>
-              <a:t> </a:t>
-            </a:r>
-          </a:p>
-          <a:p>
+                <a:latin typeface="Courier New" panose="02070309020205020404" pitchFamily="49" charset="0"/>
+                <a:cs typeface="Courier New" panose="02070309020205020404" pitchFamily="49" charset="0"/>
+              </a:rPr>
+              <a:t> checkout –b develop</a:t>
+            </a:r>
             <a:r>
               <a:rPr lang="en-US" dirty="0">
+                <a:cs typeface="Courier New" panose="02070309020205020404" pitchFamily="49" charset="0"/>
+              </a:rPr>
+              <a:t> - create branch &amp; switch to it</a:t>
+            </a:r>
+          </a:p>
+          <a:p>
+            <a:pPr lvl="1"/>
+            <a:r>
+              <a:rPr lang="en-US" dirty="0">
+                <a:cs typeface="Courier New" panose="02070309020205020404" pitchFamily="49" charset="0"/>
+              </a:rPr>
+              <a:t>Call it whatever you want – this example called it ‘develop’</a:t>
+            </a:r>
+          </a:p>
+          <a:p>
+            <a:r>
+              <a:rPr lang="en-US" dirty="0" err="1">
+                <a:latin typeface="Courier New" panose="02070309020205020404" pitchFamily="49" charset="0"/>
+                <a:cs typeface="Courier New" panose="02070309020205020404" pitchFamily="49" charset="0"/>
+              </a:rPr>
+              <a:t>git</a:t>
+            </a:r>
+            <a:r>
+              <a:rPr lang="en-US" dirty="0">
+                <a:latin typeface="Courier New" panose="02070309020205020404" pitchFamily="49" charset="0"/>
+                <a:cs typeface="Courier New" panose="02070309020205020404" pitchFamily="49" charset="0"/>
+              </a:rPr>
+              <a:t> branch </a:t>
+            </a:r>
+            <a:r>
+              <a:rPr lang="en-US" dirty="0">
+                <a:cs typeface="Courier New" panose="02070309020205020404" pitchFamily="49" charset="0"/>
+              </a:rPr>
+              <a:t>– list branches in repo &amp; current branch</a:t>
+            </a:r>
+          </a:p>
+          <a:p>
+            <a:r>
+              <a:rPr lang="en-US" dirty="0" err="1">
+                <a:latin typeface="Courier New" panose="02070309020205020404" pitchFamily="49" charset="0"/>
+                <a:cs typeface="Courier New" panose="02070309020205020404" pitchFamily="49" charset="0"/>
+              </a:rPr>
+              <a:t>gitk</a:t>
+            </a:r>
+            <a:r>
+              <a:rPr lang="en-US" dirty="0">
+                <a:latin typeface="Courier New" panose="02070309020205020404" pitchFamily="49" charset="0"/>
+                <a:cs typeface="Courier New" panose="02070309020205020404" pitchFamily="49" charset="0"/>
+              </a:rPr>
+              <a:t> --all</a:t>
+            </a:r>
+            <a:r>
+              <a:rPr lang="en-US" dirty="0">
+                <a:cs typeface="Courier New" panose="02070309020205020404" pitchFamily="49" charset="0"/>
+              </a:rPr>
+              <a:t> – see your current commit tree</a:t>
+            </a:r>
+          </a:p>
+          <a:p>
+            <a:pPr lvl="1"/>
+            <a:r>
+              <a:rPr lang="en-US" sz="2000" dirty="0">
                 <a:hlinkClick r:id="rId3"/>
               </a:rPr>
-              <a:t>https://git-scm.com/book/en/v2/Git-Branching-Basic-Branching-and-Merging</a:t>
-            </a:r>
-            <a:r>
-              <a:rPr lang="en-US" dirty="0"/>
-              <a:t> </a:t>
-            </a:r>
-          </a:p>
-          <a:p>
-            <a:r>
-              <a:rPr lang="en-US" dirty="0">
-                <a:hlinkClick r:id="rId4"/>
-              </a:rPr>
-              <a:t>https://www.atlassian.com/git/tutorials/git-merge</a:t>
-            </a:r>
-            <a:endParaRPr lang="en-US" dirty="0"/>
-          </a:p>
-          <a:p>
-            <a:r>
-              <a:rPr lang="en-US" dirty="0">
-                <a:hlinkClick r:id="rId5"/>
-              </a:rPr>
-              <a:t>https://git-scm.com/book/en/v2/Git-Branching-Branches-in-a-Nutshell</a:t>
-            </a:r>
-            <a:r>
-              <a:rPr lang="en-US" dirty="0"/>
-              <a:t>  </a:t>
-            </a:r>
-            <a:endParaRPr lang="en-US" dirty="0"/>
+              <a:t>lostechies.com/</a:t>
+            </a:r>
+            <a:r>
+              <a:rPr lang="en-US" sz="2000" dirty="0" err="1">
+                <a:hlinkClick r:id="rId3"/>
+              </a:rPr>
+              <a:t>joshuaflanagan</a:t>
+            </a:r>
+            <a:r>
+              <a:rPr lang="en-US" sz="2000" dirty="0">
+                <a:hlinkClick r:id="rId3"/>
+              </a:rPr>
+              <a:t>/2010/09/03/use-</a:t>
+            </a:r>
+            <a:r>
+              <a:rPr lang="en-US" sz="2000" dirty="0" err="1">
+                <a:hlinkClick r:id="rId3"/>
+              </a:rPr>
+              <a:t>gitk</a:t>
+            </a:r>
+            <a:r>
+              <a:rPr lang="en-US" sz="2000" dirty="0">
+                <a:hlinkClick r:id="rId3"/>
+              </a:rPr>
+              <a:t>-to-understand-</a:t>
+            </a:r>
+            <a:r>
+              <a:rPr lang="en-US" sz="2000" dirty="0" err="1">
+                <a:hlinkClick r:id="rId3"/>
+              </a:rPr>
+              <a:t>git</a:t>
+            </a:r>
+            <a:r>
+              <a:rPr lang="en-US" sz="2000" dirty="0">
+                <a:hlinkClick r:id="rId3"/>
+              </a:rPr>
+              <a:t>/</a:t>
+            </a:r>
+            <a:endParaRPr lang="en-US" sz="2000" dirty="0"/>
+          </a:p>
+          <a:p>
+            <a:pPr lvl="1"/>
+            <a:endParaRPr lang="en-US" sz="2000" dirty="0"/>
+          </a:p>
+          <a:p>
+            <a:pPr marL="574675" lvl="1" indent="0">
+              <a:buNone/>
+            </a:pPr>
+            <a:endParaRPr lang="en-US" sz="2000" dirty="0"/>
+          </a:p>
+          <a:p>
+            <a:r>
+              <a:rPr lang="en-US" sz="2200" dirty="0"/>
+              <a:t>In </a:t>
+            </a:r>
+            <a:r>
+              <a:rPr lang="en-US" sz="2200" dirty="0" err="1"/>
+              <a:t>Git</a:t>
+            </a:r>
+            <a:r>
+              <a:rPr lang="en-US" sz="2200" dirty="0"/>
+              <a:t> bash it should show your current branch</a:t>
+            </a:r>
+          </a:p>
+          <a:p>
+            <a:pPr marL="228600" indent="0">
+              <a:buNone/>
+            </a:pPr>
+            <a:endParaRPr lang="en-US" sz="2200" dirty="0"/>
+          </a:p>
+          <a:p>
+            <a:endParaRPr lang="en-US" dirty="0">
+              <a:cs typeface="Courier New" panose="02070309020205020404" pitchFamily="49" charset="0"/>
+            </a:endParaRPr>
+          </a:p>
+          <a:p>
+            <a:pPr marL="228600" indent="0">
+              <a:buNone/>
+            </a:pPr>
+            <a:endParaRPr lang="en-US" dirty="0">
+              <a:cs typeface="Courier New" panose="02070309020205020404" pitchFamily="49" charset="0"/>
+            </a:endParaRPr>
+          </a:p>
+          <a:p>
+            <a:endParaRPr lang="en-US" dirty="0">
+              <a:latin typeface="Courier New" panose="02070309020205020404" pitchFamily="49" charset="0"/>
+              <a:cs typeface="Courier New" panose="02070309020205020404" pitchFamily="49" charset="0"/>
+              <a:hlinkClick r:id="rId4"/>
+            </a:endParaRPr>
           </a:p>
         </p:txBody>
       </p:sp>
+      <p:pic>
+        <p:nvPicPr>
+          <p:cNvPr id="4" name="Picture 3"/>
+          <p:cNvPicPr>
+            <a:picLocks noChangeAspect="1"/>
+          </p:cNvPicPr>
+          <p:nvPr/>
+        </p:nvPicPr>
+        <p:blipFill rotWithShape="1">
+          <a:blip r:embed="rId5"/>
+          <a:srcRect l="833" t="8889" r="75833" b="89630"/>
+          <a:stretch/>
+        </p:blipFill>
+        <p:spPr>
+          <a:xfrm>
+            <a:off x="304800" y="3581400"/>
+            <a:ext cx="8534400" cy="304800"/>
+          </a:xfrm>
+          <a:prstGeom prst="rect">
+            <a:avLst/>
+          </a:prstGeom>
+        </p:spPr>
+      </p:pic>
+      <p:pic>
+        <p:nvPicPr>
+          <p:cNvPr id="5" name="Picture 4"/>
+          <p:cNvPicPr>
+            <a:picLocks noChangeAspect="1"/>
+          </p:cNvPicPr>
+          <p:nvPr/>
+        </p:nvPicPr>
+        <p:blipFill rotWithShape="1">
+          <a:blip r:embed="rId6"/>
+          <a:srcRect l="9478" t="53333" r="68959" b="42223"/>
+          <a:stretch/>
+        </p:blipFill>
+        <p:spPr>
+          <a:xfrm>
+            <a:off x="533400" y="4724400"/>
+            <a:ext cx="7886700" cy="914400"/>
+          </a:xfrm>
+          <a:prstGeom prst="rect">
+            <a:avLst/>
+          </a:prstGeom>
+        </p:spPr>
+      </p:pic>
     </p:spTree>
     <p:extLst>
       <p:ext uri="{BB962C8B-B14F-4D97-AF65-F5344CB8AC3E}">
@@ -7974,7 +9852,7 @@
             </a:pPr>
             <a:r>
               <a:rPr lang="en-US" dirty="0"/>
-              <a:t>Markdown preview: </a:t>
+              <a:t>Markdown preview for Google Chrome: </a:t>
             </a:r>
             <a:r>
               <a:rPr lang="en-US" dirty="0">

</xml_diff>

<commit_message>
Add draft of installing git
</commit_message>
<xml_diff>
--- a/Github introduction Lukas.pptx
+++ b/Github introduction Lukas.pptx
@@ -8669,6 +8669,34 @@
               <a:defRPr/>
             </a:pPr>
             <a:r>
+              <a:rPr lang="en-US" dirty="0"/>
+              <a:t>Set up credentials so it doesn’t always ask for password (</a:t>
+            </a:r>
+            <a:r>
+              <a:rPr lang="en-US" i="1" dirty="0"/>
+              <a:t>not sure how to do this step by step</a:t>
+            </a:r>
+            <a:r>
+              <a:rPr lang="en-US" dirty="0"/>
+              <a:t>): </a:t>
+            </a:r>
+            <a:r>
+              <a:rPr lang="en-US" dirty="0">
+                <a:hlinkClick r:id="rId8"/>
+              </a:rPr>
+              <a:t>help.github.com/articles/why-is-git-always-asking-for-my-password/</a:t>
+            </a:r>
+            <a:r>
+              <a:rPr lang="en-US" dirty="0"/>
+              <a:t> </a:t>
+            </a:r>
+            <a:endParaRPr lang="en-US" dirty="0"/>
+          </a:p>
+          <a:p>
+            <a:pPr lvl="1">
+              <a:defRPr/>
+            </a:pPr>
+            <a:r>
               <a:rPr lang="en-US" dirty="0" err="1">
                 <a:latin typeface="Courier New" panose="02070309020205020404" pitchFamily="49" charset="0"/>
                 <a:cs typeface="Courier New" panose="02070309020205020404" pitchFamily="49" charset="0"/>
@@ -8701,7 +8729,7 @@
             </a:r>
             <a:r>
               <a:rPr lang="en-US" dirty="0">
-                <a:hlinkClick r:id="rId8"/>
+                <a:hlinkClick r:id="rId9"/>
               </a:rPr>
               <a:t>education.github.com/pack</a:t>
             </a:r>

</xml_diff>